<commit_message>
updated dictionary lecture and example
</commit_message>
<xml_diff>
--- a/Slides/On-Campus/10_02_HTML_Files_And_Dictionary.pptx
+++ b/Slides/On-Campus/10_02_HTML_Files_And_Dictionary.pptx
@@ -5,21 +5,25 @@
     <p:sldMasterId id="2147483648" r:id="rId1"/>
   </p:sldMasterIdLst>
   <p:notesMasterIdLst>
-    <p:notesMasterId r:id="rId11"/>
+    <p:notesMasterId r:id="rId15"/>
   </p:notesMasterIdLst>
   <p:handoutMasterIdLst>
-    <p:handoutMasterId r:id="rId12"/>
+    <p:handoutMasterId r:id="rId16"/>
   </p:handoutMasterIdLst>
   <p:sldIdLst>
     <p:sldId id="256" r:id="rId2"/>
-    <p:sldId id="260" r:id="rId3"/>
-    <p:sldId id="261" r:id="rId4"/>
-    <p:sldId id="262" r:id="rId5"/>
-    <p:sldId id="263" r:id="rId6"/>
-    <p:sldId id="264" r:id="rId7"/>
-    <p:sldId id="257" r:id="rId8"/>
-    <p:sldId id="258" r:id="rId9"/>
-    <p:sldId id="259" r:id="rId10"/>
+    <p:sldId id="274" r:id="rId3"/>
+    <p:sldId id="260" r:id="rId4"/>
+    <p:sldId id="261" r:id="rId5"/>
+    <p:sldId id="262" r:id="rId6"/>
+    <p:sldId id="263" r:id="rId7"/>
+    <p:sldId id="264" r:id="rId8"/>
+    <p:sldId id="275" r:id="rId9"/>
+    <p:sldId id="257" r:id="rId10"/>
+    <p:sldId id="276" r:id="rId11"/>
+    <p:sldId id="258" r:id="rId12"/>
+    <p:sldId id="277" r:id="rId13"/>
+    <p:sldId id="259" r:id="rId14"/>
   </p:sldIdLst>
   <p:sldSz cx="13817600" cy="7772400"/>
   <p:notesSz cx="6858000" cy="9144000"/>
@@ -222,7 +226,7 @@
           <a:p>
             <a:fld id="{4D7E51A5-B478-1E40-8CBB-0DAA8831E99D}" type="datetimeFigureOut">
               <a:rPr lang="en-US" smtClean="0"/>
-              <a:t>10/16/2021</a:t>
+              <a:t>10/28/2021</a:t>
             </a:fld>
             <a:endParaRPr lang="en-US"/>
           </a:p>
@@ -387,7 +391,7 @@
           <a:p>
             <a:fld id="{D0ED587F-861E-6740-9643-E3DDAE89B8D6}" type="datetimeFigureOut">
               <a:rPr lang="en-US" smtClean="0"/>
-              <a:t>10/16/2021</a:t>
+              <a:t>10/28/2021</a:t>
             </a:fld>
             <a:endParaRPr lang="en-US"/>
           </a:p>
@@ -7828,7 +7832,1921 @@
 </p:sld>
 </file>
 
+<file path=ppt/slides/slide10.xml><?xml version="1.0" encoding="utf-8"?>
+<p:sld xmlns:a="http://schemas.openxmlformats.org/drawingml/2006/main" xmlns:r="http://schemas.openxmlformats.org/officeDocument/2006/relationships" xmlns:p="http://schemas.openxmlformats.org/presentationml/2006/main">
+  <p:cSld>
+    <p:spTree>
+      <p:nvGrpSpPr>
+        <p:cNvPr id="1" name=""/>
+        <p:cNvGrpSpPr/>
+        <p:nvPr/>
+      </p:nvGrpSpPr>
+      <p:grpSpPr>
+        <a:xfrm>
+          <a:off x="0" y="0"/>
+          <a:ext cx="0" cy="0"/>
+          <a:chOff x="0" y="0"/>
+          <a:chExt cx="0" cy="0"/>
+        </a:xfrm>
+      </p:grpSpPr>
+      <p:sp>
+        <p:nvSpPr>
+          <p:cNvPr id="2" name="Title 1">
+            <a:extLst>
+              <a:ext uri="{FF2B5EF4-FFF2-40B4-BE49-F238E27FC236}">
+                <a16:creationId xmlns:a16="http://schemas.microsoft.com/office/drawing/2014/main" id="{488BBDC8-B9F2-44CB-9A98-BFC83FAB3D60}"/>
+              </a:ext>
+            </a:extLst>
+          </p:cNvPr>
+          <p:cNvSpPr>
+            <a:spLocks noGrp="1"/>
+          </p:cNvSpPr>
+          <p:nvPr>
+            <p:ph type="title"/>
+          </p:nvPr>
+        </p:nvSpPr>
+        <p:spPr/>
+        <p:txBody>
+          <a:bodyPr/>
+          <a:lstStyle/>
+          <a:p>
+            <a:r>
+              <a:rPr lang="en-US" dirty="0"/>
+              <a:t>Practice</a:t>
+            </a:r>
+          </a:p>
+        </p:txBody>
+      </p:sp>
+      <p:sp>
+        <p:nvSpPr>
+          <p:cNvPr id="3" name="Text Placeholder 2">
+            <a:extLst>
+              <a:ext uri="{FF2B5EF4-FFF2-40B4-BE49-F238E27FC236}">
+                <a16:creationId xmlns:a16="http://schemas.microsoft.com/office/drawing/2014/main" id="{1F77DCC2-D883-46C9-BB39-58A80FF96C33}"/>
+              </a:ext>
+            </a:extLst>
+          </p:cNvPr>
+          <p:cNvSpPr>
+            <a:spLocks noGrp="1"/>
+          </p:cNvSpPr>
+          <p:nvPr>
+            <p:ph type="body" sz="quarter" idx="10"/>
+          </p:nvPr>
+        </p:nvSpPr>
+        <p:spPr>
+          <a:xfrm>
+            <a:off x="628075" y="1776683"/>
+            <a:ext cx="12561453" cy="3771545"/>
+          </a:xfrm>
+        </p:spPr>
+        <p:txBody>
+          <a:bodyPr/>
+          <a:lstStyle/>
+          <a:p>
+            <a:r>
+              <a:rPr lang="en-US" dirty="0"/>
+              <a:t>Write a dictionary that stores grades (like example on last slide)</a:t>
+            </a:r>
+          </a:p>
+          <a:p>
+            <a:pPr lvl="1"/>
+            <a:r>
+              <a:rPr lang="en-US" dirty="0">
+                <a:latin typeface="Consolas" panose="020B0609020204030204" pitchFamily="49" charset="0"/>
+              </a:rPr>
+              <a:t>grades = {“assignment1”: 2, “assignment2”:4}</a:t>
+            </a:r>
+          </a:p>
+          <a:p>
+            <a:r>
+              <a:rPr lang="en-US" dirty="0"/>
+              <a:t>Have at least five different assignments in the dictionary.</a:t>
+            </a:r>
+          </a:p>
+          <a:p>
+            <a:r>
+              <a:rPr lang="en-US" dirty="0"/>
+              <a:t>Write code that changes one of the assignments grades to be a different value</a:t>
+            </a:r>
+          </a:p>
+          <a:p>
+            <a:endParaRPr lang="en-US" dirty="0"/>
+          </a:p>
+          <a:p>
+            <a:r>
+              <a:rPr lang="en-US" dirty="0"/>
+              <a:t>Challenge problem:</a:t>
+            </a:r>
+          </a:p>
+          <a:p>
+            <a:pPr lvl="1"/>
+            <a:r>
+              <a:rPr lang="en-US" dirty="0"/>
+              <a:t>Let someone add and update grades through the console/terminal ( remember “input(“enter a value”))</a:t>
+            </a:r>
+          </a:p>
+          <a:p>
+            <a:endParaRPr lang="en-US" dirty="0"/>
+          </a:p>
+        </p:txBody>
+      </p:sp>
+    </p:spTree>
+    <p:extLst>
+      <p:ext uri="{BB962C8B-B14F-4D97-AF65-F5344CB8AC3E}">
+        <p14:creationId xmlns:p14="http://schemas.microsoft.com/office/powerpoint/2010/main" val="3607335165"/>
+      </p:ext>
+    </p:extLst>
+  </p:cSld>
+  <p:clrMapOvr>
+    <a:masterClrMapping/>
+  </p:clrMapOvr>
+  <mc:AlternateContent xmlns:mc="http://schemas.openxmlformats.org/markup-compatibility/2006" xmlns:p14="http://schemas.microsoft.com/office/powerpoint/2010/main">
+    <mc:Choice Requires="p14">
+      <p:transition p14:dur="300">
+        <p:fade/>
+      </p:transition>
+    </mc:Choice>
+    <mc:Fallback xmlns="">
+      <p:transition>
+        <p:fade/>
+      </p:transition>
+    </mc:Fallback>
+  </mc:AlternateContent>
+</p:sld>
+</file>
+
+<file path=ppt/slides/slide11.xml><?xml version="1.0" encoding="utf-8"?>
+<p:sld xmlns:a="http://schemas.openxmlformats.org/drawingml/2006/main" xmlns:r="http://schemas.openxmlformats.org/officeDocument/2006/relationships" xmlns:p="http://schemas.openxmlformats.org/presentationml/2006/main">
+  <p:cSld>
+    <p:spTree>
+      <p:nvGrpSpPr>
+        <p:cNvPr id="1" name=""/>
+        <p:cNvGrpSpPr/>
+        <p:nvPr/>
+      </p:nvGrpSpPr>
+      <p:grpSpPr>
+        <a:xfrm>
+          <a:off x="0" y="0"/>
+          <a:ext cx="0" cy="0"/>
+          <a:chOff x="0" y="0"/>
+          <a:chExt cx="0" cy="0"/>
+        </a:xfrm>
+      </p:grpSpPr>
+      <p:sp>
+        <p:nvSpPr>
+          <p:cNvPr id="2" name="Title 1">
+            <a:extLst>
+              <a:ext uri="{FF2B5EF4-FFF2-40B4-BE49-F238E27FC236}">
+                <a16:creationId xmlns:a16="http://schemas.microsoft.com/office/drawing/2014/main" id="{A4704001-F6A6-9640-86A0-97967BEE6FDC}"/>
+              </a:ext>
+            </a:extLst>
+          </p:cNvPr>
+          <p:cNvSpPr>
+            <a:spLocks noGrp="1"/>
+          </p:cNvSpPr>
+          <p:nvPr>
+            <p:ph type="title"/>
+          </p:nvPr>
+        </p:nvSpPr>
+        <p:spPr/>
+        <p:txBody>
+          <a:bodyPr/>
+          <a:lstStyle/>
+          <a:p>
+            <a:r>
+              <a:rPr lang="en-US" dirty="0"/>
+              <a:t>Looping Through Dictionaries</a:t>
+            </a:r>
+          </a:p>
+        </p:txBody>
+      </p:sp>
+      <p:sp>
+        <p:nvSpPr>
+          <p:cNvPr id="3" name="Text Placeholder 2">
+            <a:extLst>
+              <a:ext uri="{FF2B5EF4-FFF2-40B4-BE49-F238E27FC236}">
+                <a16:creationId xmlns:a16="http://schemas.microsoft.com/office/drawing/2014/main" id="{78BF5854-456E-2E42-9956-B6A13495CB48}"/>
+              </a:ext>
+            </a:extLst>
+          </p:cNvPr>
+          <p:cNvSpPr>
+            <a:spLocks noGrp="1"/>
+          </p:cNvSpPr>
+          <p:nvPr>
+            <p:ph type="body" sz="quarter" idx="10"/>
+          </p:nvPr>
+        </p:nvSpPr>
+        <p:spPr>
+          <a:xfrm>
+            <a:off x="628075" y="1776683"/>
+            <a:ext cx="12561453" cy="2312684"/>
+          </a:xfrm>
+        </p:spPr>
+        <p:txBody>
+          <a:bodyPr/>
+          <a:lstStyle/>
+          <a:p>
+            <a:r>
+              <a:rPr lang="en-US" dirty="0" err="1"/>
+              <a:t>dict.keys</a:t>
+            </a:r>
+            <a:r>
+              <a:rPr lang="en-US" dirty="0"/>
+              <a:t>() -  give list of keys</a:t>
+            </a:r>
+          </a:p>
+          <a:p>
+            <a:pPr lvl="1"/>
+            <a:r>
+              <a:rPr lang="en-US" dirty="0"/>
+              <a:t>in no particular order! </a:t>
+            </a:r>
+          </a:p>
+          <a:p>
+            <a:r>
+              <a:rPr lang="en-US" dirty="0" err="1"/>
+              <a:t>dict.values</a:t>
+            </a:r>
+            <a:r>
+              <a:rPr lang="en-US" dirty="0"/>
+              <a:t>() -  give items  *without  keys*</a:t>
+            </a:r>
+          </a:p>
+          <a:p>
+            <a:r>
+              <a:rPr lang="en-US" dirty="0" err="1"/>
+              <a:t>dict.items</a:t>
+            </a:r>
+            <a:r>
+              <a:rPr lang="en-US" dirty="0"/>
+              <a:t>()  - gives tuple of (key,  value)</a:t>
+            </a:r>
+          </a:p>
+          <a:p>
+            <a:endParaRPr lang="en-US" dirty="0"/>
+          </a:p>
+        </p:txBody>
+      </p:sp>
+      <p:sp>
+        <p:nvSpPr>
+          <p:cNvPr id="5" name="TextBox 4">
+            <a:extLst>
+              <a:ext uri="{FF2B5EF4-FFF2-40B4-BE49-F238E27FC236}">
+                <a16:creationId xmlns:a16="http://schemas.microsoft.com/office/drawing/2014/main" id="{74CAC2A5-95C0-E14B-BDAA-750D0B2F9F4A}"/>
+              </a:ext>
+            </a:extLst>
+          </p:cNvPr>
+          <p:cNvSpPr txBox="1"/>
+          <p:nvPr/>
+        </p:nvSpPr>
+        <p:spPr>
+          <a:xfrm>
+            <a:off x="628072" y="3694442"/>
+            <a:ext cx="8261928" cy="707886"/>
+          </a:xfrm>
+          <a:prstGeom prst="rect">
+            <a:avLst/>
+          </a:prstGeom>
+          <a:noFill/>
+        </p:spPr>
+        <p:txBody>
+          <a:bodyPr wrap="square">
+            <a:spAutoFit/>
+          </a:bodyPr>
+          <a:lstStyle/>
+          <a:p>
+            <a:r>
+              <a:rPr lang="en-US" dirty="0">
+                <a:solidFill>
+                  <a:srgbClr val="CC7832"/>
+                </a:solidFill>
+                <a:effectLst/>
+                <a:latin typeface="Consolas" panose="020B0609020204030204" pitchFamily="49" charset="0"/>
+                <a:cs typeface="Consolas" panose="020B0609020204030204" pitchFamily="49" charset="0"/>
+              </a:rPr>
+              <a:t>for </a:t>
+            </a:r>
+            <a:r>
+              <a:rPr lang="en-US" dirty="0">
+                <a:latin typeface="Consolas" panose="020B0609020204030204" pitchFamily="49" charset="0"/>
+                <a:cs typeface="Consolas" panose="020B0609020204030204" pitchFamily="49" charset="0"/>
+              </a:rPr>
+              <a:t>key</a:t>
+            </a:r>
+            <a:r>
+              <a:rPr lang="en-US" dirty="0">
+                <a:solidFill>
+                  <a:srgbClr val="CC7832"/>
+                </a:solidFill>
+                <a:effectLst/>
+                <a:latin typeface="Consolas" panose="020B0609020204030204" pitchFamily="49" charset="0"/>
+                <a:cs typeface="Consolas" panose="020B0609020204030204" pitchFamily="49" charset="0"/>
+              </a:rPr>
+              <a:t>, </a:t>
+            </a:r>
+            <a:r>
+              <a:rPr lang="en-US" dirty="0">
+                <a:latin typeface="Consolas" panose="020B0609020204030204" pitchFamily="49" charset="0"/>
+                <a:cs typeface="Consolas" panose="020B0609020204030204" pitchFamily="49" charset="0"/>
+              </a:rPr>
+              <a:t>value </a:t>
+            </a:r>
+            <a:r>
+              <a:rPr lang="en-US" dirty="0">
+                <a:solidFill>
+                  <a:srgbClr val="CC7832"/>
+                </a:solidFill>
+                <a:effectLst/>
+                <a:latin typeface="Consolas" panose="020B0609020204030204" pitchFamily="49" charset="0"/>
+                <a:cs typeface="Consolas" panose="020B0609020204030204" pitchFamily="49" charset="0"/>
+              </a:rPr>
+              <a:t>in </a:t>
+            </a:r>
+            <a:r>
+              <a:rPr lang="en-US" dirty="0" err="1">
+                <a:latin typeface="Consolas" panose="020B0609020204030204" pitchFamily="49" charset="0"/>
+                <a:cs typeface="Consolas" panose="020B0609020204030204" pitchFamily="49" charset="0"/>
+              </a:rPr>
+              <a:t>authorized.items</a:t>
+            </a:r>
+            <a:r>
+              <a:rPr lang="en-US" dirty="0">
+                <a:latin typeface="Consolas" panose="020B0609020204030204" pitchFamily="49" charset="0"/>
+                <a:cs typeface="Consolas" panose="020B0609020204030204" pitchFamily="49" charset="0"/>
+              </a:rPr>
+              <a:t>():</a:t>
+            </a:r>
+            <a:br>
+              <a:rPr lang="en-US" dirty="0">
+                <a:latin typeface="Consolas" panose="020B0609020204030204" pitchFamily="49" charset="0"/>
+                <a:cs typeface="Consolas" panose="020B0609020204030204" pitchFamily="49" charset="0"/>
+              </a:rPr>
+            </a:br>
+            <a:r>
+              <a:rPr lang="en-US" dirty="0">
+                <a:latin typeface="Consolas" panose="020B0609020204030204" pitchFamily="49" charset="0"/>
+                <a:cs typeface="Consolas" panose="020B0609020204030204" pitchFamily="49" charset="0"/>
+              </a:rPr>
+              <a:t>    </a:t>
+            </a:r>
+            <a:r>
+              <a:rPr lang="en-US" dirty="0">
+                <a:solidFill>
+                  <a:srgbClr val="8888C6"/>
+                </a:solidFill>
+                <a:effectLst/>
+                <a:latin typeface="Consolas" panose="020B0609020204030204" pitchFamily="49" charset="0"/>
+                <a:cs typeface="Consolas" panose="020B0609020204030204" pitchFamily="49" charset="0"/>
+              </a:rPr>
+              <a:t>print</a:t>
+            </a:r>
+            <a:r>
+              <a:rPr lang="en-US" dirty="0">
+                <a:latin typeface="Consolas" panose="020B0609020204030204" pitchFamily="49" charset="0"/>
+                <a:cs typeface="Consolas" panose="020B0609020204030204" pitchFamily="49" charset="0"/>
+              </a:rPr>
+              <a:t>(</a:t>
+            </a:r>
+            <a:r>
+              <a:rPr lang="en-US" dirty="0">
+                <a:solidFill>
+                  <a:srgbClr val="6A8759"/>
+                </a:solidFill>
+                <a:effectLst/>
+                <a:latin typeface="Consolas" panose="020B0609020204030204" pitchFamily="49" charset="0"/>
+                <a:cs typeface="Consolas" panose="020B0609020204030204" pitchFamily="49" charset="0"/>
+              </a:rPr>
+              <a:t>"{} is authorized in {}"</a:t>
+            </a:r>
+            <a:r>
+              <a:rPr lang="en-US" dirty="0">
+                <a:latin typeface="Consolas" panose="020B0609020204030204" pitchFamily="49" charset="0"/>
+                <a:cs typeface="Consolas" panose="020B0609020204030204" pitchFamily="49" charset="0"/>
+              </a:rPr>
+              <a:t>.format(key</a:t>
+            </a:r>
+            <a:r>
+              <a:rPr lang="en-US" dirty="0">
+                <a:solidFill>
+                  <a:srgbClr val="CC7832"/>
+                </a:solidFill>
+                <a:effectLst/>
+                <a:latin typeface="Consolas" panose="020B0609020204030204" pitchFamily="49" charset="0"/>
+                <a:cs typeface="Consolas" panose="020B0609020204030204" pitchFamily="49" charset="0"/>
+              </a:rPr>
+              <a:t>, </a:t>
+            </a:r>
+            <a:r>
+              <a:rPr lang="en-US" dirty="0">
+                <a:latin typeface="Consolas" panose="020B0609020204030204" pitchFamily="49" charset="0"/>
+                <a:cs typeface="Consolas" panose="020B0609020204030204" pitchFamily="49" charset="0"/>
+              </a:rPr>
+              <a:t>value))</a:t>
+            </a:r>
+          </a:p>
+        </p:txBody>
+      </p:sp>
+      <p:sp>
+        <p:nvSpPr>
+          <p:cNvPr id="7" name="TextBox 6">
+            <a:extLst>
+              <a:ext uri="{FF2B5EF4-FFF2-40B4-BE49-F238E27FC236}">
+                <a16:creationId xmlns:a16="http://schemas.microsoft.com/office/drawing/2014/main" id="{67D9FD07-F080-774F-8A0D-3E48A30DD4E0}"/>
+              </a:ext>
+            </a:extLst>
+          </p:cNvPr>
+          <p:cNvSpPr txBox="1"/>
+          <p:nvPr/>
+        </p:nvSpPr>
+        <p:spPr>
+          <a:xfrm>
+            <a:off x="628072" y="4696999"/>
+            <a:ext cx="12166600" cy="1631216"/>
+          </a:xfrm>
+          <a:prstGeom prst="rect">
+            <a:avLst/>
+          </a:prstGeom>
+          <a:noFill/>
+        </p:spPr>
+        <p:txBody>
+          <a:bodyPr wrap="square">
+            <a:spAutoFit/>
+          </a:bodyPr>
+          <a:lstStyle/>
+          <a:p>
+            <a:r>
+              <a:rPr lang="en-US" dirty="0"/>
+              <a:t>Murdoch is authorized in ['Cut &amp; Thrust', 'Rapier Spear', 'Rapier', 'Combat Archery', 'Armored Combat']</a:t>
+            </a:r>
+          </a:p>
+          <a:p>
+            <a:r>
+              <a:rPr lang="en-US" dirty="0" err="1"/>
+              <a:t>Valtaja</a:t>
+            </a:r>
+            <a:r>
+              <a:rPr lang="en-US" dirty="0"/>
+              <a:t> is authorized in ['Cut &amp; Thrust', 'Rapier Spear', 'Rapier']</a:t>
+            </a:r>
+          </a:p>
+          <a:p>
+            <a:r>
+              <a:rPr lang="en-US" dirty="0" err="1"/>
+              <a:t>Aegeon</a:t>
+            </a:r>
+            <a:r>
+              <a:rPr lang="en-US" dirty="0"/>
+              <a:t> is authorized in ['Cut &amp; Thrust', 'Rapier Spear', 'Rapier', 'Armored Combat', 'Great Weapons']</a:t>
+            </a:r>
+          </a:p>
+          <a:p>
+            <a:r>
+              <a:rPr lang="en-US" dirty="0"/>
+              <a:t>Miriam is authorized in ['Cut &amp; Thrust', 'Great Weapons’]</a:t>
+            </a:r>
+          </a:p>
+          <a:p>
+            <a:r>
+              <a:rPr lang="en-US" dirty="0"/>
+              <a:t>Felix is authorized in ['Armored Combat', 'Great Weapons']</a:t>
+            </a:r>
+          </a:p>
+        </p:txBody>
+      </p:sp>
+      <p:sp>
+        <p:nvSpPr>
+          <p:cNvPr id="8" name="TextBox 7">
+            <a:extLst>
+              <a:ext uri="{FF2B5EF4-FFF2-40B4-BE49-F238E27FC236}">
+                <a16:creationId xmlns:a16="http://schemas.microsoft.com/office/drawing/2014/main" id="{D7E31B8F-6D87-CB4A-AF17-7A85BCB206FE}"/>
+              </a:ext>
+            </a:extLst>
+          </p:cNvPr>
+          <p:cNvSpPr txBox="1"/>
+          <p:nvPr/>
+        </p:nvSpPr>
+        <p:spPr>
+          <a:xfrm>
+            <a:off x="4069721" y="6511984"/>
+            <a:ext cx="5396029" cy="400110"/>
+          </a:xfrm>
+          <a:prstGeom prst="rect">
+            <a:avLst/>
+          </a:prstGeom>
+          <a:noFill/>
+        </p:spPr>
+        <p:txBody>
+          <a:bodyPr wrap="none" rtlCol="0">
+            <a:spAutoFit/>
+          </a:bodyPr>
+          <a:lstStyle/>
+          <a:p>
+            <a:r>
+              <a:rPr lang="en-US" dirty="0"/>
+              <a:t>What if I wanted to print in alphabetical order?</a:t>
+            </a:r>
+          </a:p>
+        </p:txBody>
+      </p:sp>
+    </p:spTree>
+    <p:extLst>
+      <p:ext uri="{BB962C8B-B14F-4D97-AF65-F5344CB8AC3E}">
+        <p14:creationId xmlns:p14="http://schemas.microsoft.com/office/powerpoint/2010/main" val="3882659456"/>
+      </p:ext>
+    </p:extLst>
+  </p:cSld>
+  <p:clrMapOvr>
+    <a:masterClrMapping/>
+  </p:clrMapOvr>
+  <mc:AlternateContent xmlns:mc="http://schemas.openxmlformats.org/markup-compatibility/2006" xmlns:p14="http://schemas.microsoft.com/office/powerpoint/2010/main">
+    <mc:Choice Requires="p14">
+      <p:transition p14:dur="300">
+        <p:fade/>
+      </p:transition>
+    </mc:Choice>
+    <mc:Fallback xmlns="">
+      <p:transition>
+        <p:fade/>
+      </p:transition>
+    </mc:Fallback>
+  </mc:AlternateContent>
+</p:sld>
+</file>
+
+<file path=ppt/slides/slide12.xml><?xml version="1.0" encoding="utf-8"?>
+<p:sld xmlns:a="http://schemas.openxmlformats.org/drawingml/2006/main" xmlns:r="http://schemas.openxmlformats.org/officeDocument/2006/relationships" xmlns:p="http://schemas.openxmlformats.org/presentationml/2006/main">
+  <p:cSld>
+    <p:spTree>
+      <p:nvGrpSpPr>
+        <p:cNvPr id="1" name=""/>
+        <p:cNvGrpSpPr/>
+        <p:nvPr/>
+      </p:nvGrpSpPr>
+      <p:grpSpPr>
+        <a:xfrm>
+          <a:off x="0" y="0"/>
+          <a:ext cx="0" cy="0"/>
+          <a:chOff x="0" y="0"/>
+          <a:chExt cx="0" cy="0"/>
+        </a:xfrm>
+      </p:grpSpPr>
+      <p:sp>
+        <p:nvSpPr>
+          <p:cNvPr id="2" name="Title 1">
+            <a:extLst>
+              <a:ext uri="{FF2B5EF4-FFF2-40B4-BE49-F238E27FC236}">
+                <a16:creationId xmlns:a16="http://schemas.microsoft.com/office/drawing/2014/main" id="{7C8DF23B-47D0-4C24-A489-7431FA05B2B0}"/>
+              </a:ext>
+            </a:extLst>
+          </p:cNvPr>
+          <p:cNvSpPr>
+            <a:spLocks noGrp="1"/>
+          </p:cNvSpPr>
+          <p:nvPr>
+            <p:ph type="title"/>
+          </p:nvPr>
+        </p:nvSpPr>
+        <p:spPr/>
+        <p:txBody>
+          <a:bodyPr/>
+          <a:lstStyle/>
+          <a:p>
+            <a:r>
+              <a:rPr lang="en-US" dirty="0"/>
+              <a:t>Practice 2</a:t>
+            </a:r>
+          </a:p>
+        </p:txBody>
+      </p:sp>
+      <p:sp>
+        <p:nvSpPr>
+          <p:cNvPr id="3" name="Text Placeholder 2">
+            <a:extLst>
+              <a:ext uri="{FF2B5EF4-FFF2-40B4-BE49-F238E27FC236}">
+                <a16:creationId xmlns:a16="http://schemas.microsoft.com/office/drawing/2014/main" id="{F0E40CE0-A037-4FD9-8F52-3E0952613468}"/>
+              </a:ext>
+            </a:extLst>
+          </p:cNvPr>
+          <p:cNvSpPr>
+            <a:spLocks noGrp="1"/>
+          </p:cNvSpPr>
+          <p:nvPr>
+            <p:ph type="body" sz="quarter" idx="10"/>
+          </p:nvPr>
+        </p:nvSpPr>
+        <p:spPr>
+          <a:xfrm>
+            <a:off x="628075" y="1776683"/>
+            <a:ext cx="12561453" cy="1230145"/>
+          </a:xfrm>
+        </p:spPr>
+        <p:txBody>
+          <a:bodyPr/>
+          <a:lstStyle/>
+          <a:p>
+            <a:r>
+              <a:rPr lang="en-US" dirty="0"/>
+              <a:t>Take the code you wrote before</a:t>
+            </a:r>
+          </a:p>
+          <a:p>
+            <a:pPr lvl="1"/>
+            <a:r>
+              <a:rPr lang="en-US" dirty="0"/>
+              <a:t>Loop through all the values – printing out assignment name and grade next to it. </a:t>
+            </a:r>
+          </a:p>
+          <a:p>
+            <a:pPr lvl="1"/>
+            <a:r>
+              <a:rPr lang="en-US" dirty="0"/>
+              <a:t>Code below will help</a:t>
+            </a:r>
+          </a:p>
+        </p:txBody>
+      </p:sp>
+      <p:sp>
+        <p:nvSpPr>
+          <p:cNvPr id="4" name="TextBox 3">
+            <a:extLst>
+              <a:ext uri="{FF2B5EF4-FFF2-40B4-BE49-F238E27FC236}">
+                <a16:creationId xmlns:a16="http://schemas.microsoft.com/office/drawing/2014/main" id="{C254068B-E342-4079-A566-DEB9082AB914}"/>
+              </a:ext>
+            </a:extLst>
+          </p:cNvPr>
+          <p:cNvSpPr txBox="1"/>
+          <p:nvPr/>
+        </p:nvSpPr>
+        <p:spPr>
+          <a:xfrm>
+            <a:off x="773215" y="3238742"/>
+            <a:ext cx="8261928" cy="707886"/>
+          </a:xfrm>
+          <a:prstGeom prst="rect">
+            <a:avLst/>
+          </a:prstGeom>
+          <a:noFill/>
+        </p:spPr>
+        <p:txBody>
+          <a:bodyPr wrap="square">
+            <a:spAutoFit/>
+          </a:bodyPr>
+          <a:lstStyle/>
+          <a:p>
+            <a:r>
+              <a:rPr lang="en-US" dirty="0">
+                <a:solidFill>
+                  <a:srgbClr val="CC7832"/>
+                </a:solidFill>
+                <a:effectLst/>
+                <a:latin typeface="Consolas" panose="020B0609020204030204" pitchFamily="49" charset="0"/>
+                <a:cs typeface="Consolas" panose="020B0609020204030204" pitchFamily="49" charset="0"/>
+              </a:rPr>
+              <a:t>for </a:t>
+            </a:r>
+            <a:r>
+              <a:rPr lang="en-US" dirty="0">
+                <a:latin typeface="Consolas" panose="020B0609020204030204" pitchFamily="49" charset="0"/>
+                <a:cs typeface="Consolas" panose="020B0609020204030204" pitchFamily="49" charset="0"/>
+              </a:rPr>
+              <a:t>key</a:t>
+            </a:r>
+            <a:r>
+              <a:rPr lang="en-US" dirty="0">
+                <a:solidFill>
+                  <a:srgbClr val="CC7832"/>
+                </a:solidFill>
+                <a:effectLst/>
+                <a:latin typeface="Consolas" panose="020B0609020204030204" pitchFamily="49" charset="0"/>
+                <a:cs typeface="Consolas" panose="020B0609020204030204" pitchFamily="49" charset="0"/>
+              </a:rPr>
+              <a:t>, </a:t>
+            </a:r>
+            <a:r>
+              <a:rPr lang="en-US" dirty="0">
+                <a:latin typeface="Consolas" panose="020B0609020204030204" pitchFamily="49" charset="0"/>
+                <a:cs typeface="Consolas" panose="020B0609020204030204" pitchFamily="49" charset="0"/>
+              </a:rPr>
+              <a:t>value </a:t>
+            </a:r>
+            <a:r>
+              <a:rPr lang="en-US" dirty="0">
+                <a:solidFill>
+                  <a:srgbClr val="CC7832"/>
+                </a:solidFill>
+                <a:effectLst/>
+                <a:latin typeface="Consolas" panose="020B0609020204030204" pitchFamily="49" charset="0"/>
+                <a:cs typeface="Consolas" panose="020B0609020204030204" pitchFamily="49" charset="0"/>
+              </a:rPr>
+              <a:t>in </a:t>
+            </a:r>
+            <a:r>
+              <a:rPr lang="en-US" dirty="0" err="1">
+                <a:latin typeface="Consolas" panose="020B0609020204030204" pitchFamily="49" charset="0"/>
+                <a:cs typeface="Consolas" panose="020B0609020204030204" pitchFamily="49" charset="0"/>
+              </a:rPr>
+              <a:t>authorized.items</a:t>
+            </a:r>
+            <a:r>
+              <a:rPr lang="en-US" dirty="0">
+                <a:latin typeface="Consolas" panose="020B0609020204030204" pitchFamily="49" charset="0"/>
+                <a:cs typeface="Consolas" panose="020B0609020204030204" pitchFamily="49" charset="0"/>
+              </a:rPr>
+              <a:t>():</a:t>
+            </a:r>
+            <a:br>
+              <a:rPr lang="en-US" dirty="0">
+                <a:latin typeface="Consolas" panose="020B0609020204030204" pitchFamily="49" charset="0"/>
+                <a:cs typeface="Consolas" panose="020B0609020204030204" pitchFamily="49" charset="0"/>
+              </a:rPr>
+            </a:br>
+            <a:r>
+              <a:rPr lang="en-US" dirty="0">
+                <a:latin typeface="Consolas" panose="020B0609020204030204" pitchFamily="49" charset="0"/>
+                <a:cs typeface="Consolas" panose="020B0609020204030204" pitchFamily="49" charset="0"/>
+              </a:rPr>
+              <a:t>    </a:t>
+            </a:r>
+            <a:r>
+              <a:rPr lang="en-US" dirty="0">
+                <a:solidFill>
+                  <a:srgbClr val="8888C6"/>
+                </a:solidFill>
+                <a:effectLst/>
+                <a:latin typeface="Consolas" panose="020B0609020204030204" pitchFamily="49" charset="0"/>
+                <a:cs typeface="Consolas" panose="020B0609020204030204" pitchFamily="49" charset="0"/>
+              </a:rPr>
+              <a:t>print</a:t>
+            </a:r>
+            <a:r>
+              <a:rPr lang="en-US" dirty="0">
+                <a:latin typeface="Consolas" panose="020B0609020204030204" pitchFamily="49" charset="0"/>
+                <a:cs typeface="Consolas" panose="020B0609020204030204" pitchFamily="49" charset="0"/>
+              </a:rPr>
+              <a:t>(</a:t>
+            </a:r>
+            <a:r>
+              <a:rPr lang="en-US" dirty="0">
+                <a:solidFill>
+                  <a:srgbClr val="6A8759"/>
+                </a:solidFill>
+                <a:effectLst/>
+                <a:latin typeface="Consolas" panose="020B0609020204030204" pitchFamily="49" charset="0"/>
+                <a:cs typeface="Consolas" panose="020B0609020204030204" pitchFamily="49" charset="0"/>
+              </a:rPr>
+              <a:t>"{} is authorized in {}"</a:t>
+            </a:r>
+            <a:r>
+              <a:rPr lang="en-US" dirty="0">
+                <a:latin typeface="Consolas" panose="020B0609020204030204" pitchFamily="49" charset="0"/>
+                <a:cs typeface="Consolas" panose="020B0609020204030204" pitchFamily="49" charset="0"/>
+              </a:rPr>
+              <a:t>.format(key</a:t>
+            </a:r>
+            <a:r>
+              <a:rPr lang="en-US" dirty="0">
+                <a:solidFill>
+                  <a:srgbClr val="CC7832"/>
+                </a:solidFill>
+                <a:effectLst/>
+                <a:latin typeface="Consolas" panose="020B0609020204030204" pitchFamily="49" charset="0"/>
+                <a:cs typeface="Consolas" panose="020B0609020204030204" pitchFamily="49" charset="0"/>
+              </a:rPr>
+              <a:t>, </a:t>
+            </a:r>
+            <a:r>
+              <a:rPr lang="en-US" dirty="0">
+                <a:latin typeface="Consolas" panose="020B0609020204030204" pitchFamily="49" charset="0"/>
+                <a:cs typeface="Consolas" panose="020B0609020204030204" pitchFamily="49" charset="0"/>
+              </a:rPr>
+              <a:t>value))</a:t>
+            </a:r>
+          </a:p>
+        </p:txBody>
+      </p:sp>
+    </p:spTree>
+    <p:extLst>
+      <p:ext uri="{BB962C8B-B14F-4D97-AF65-F5344CB8AC3E}">
+        <p14:creationId xmlns:p14="http://schemas.microsoft.com/office/powerpoint/2010/main" val="756640790"/>
+      </p:ext>
+    </p:extLst>
+  </p:cSld>
+  <p:clrMapOvr>
+    <a:masterClrMapping/>
+  </p:clrMapOvr>
+  <mc:AlternateContent xmlns:mc="http://schemas.openxmlformats.org/markup-compatibility/2006" xmlns:p14="http://schemas.microsoft.com/office/powerpoint/2010/main">
+    <mc:Choice Requires="p14">
+      <p:transition p14:dur="300">
+        <p:fade/>
+      </p:transition>
+    </mc:Choice>
+    <mc:Fallback xmlns="">
+      <p:transition>
+        <p:fade/>
+      </p:transition>
+    </mc:Fallback>
+  </mc:AlternateContent>
+</p:sld>
+</file>
+
+<file path=ppt/slides/slide13.xml><?xml version="1.0" encoding="utf-8"?>
+<p:sld xmlns:a="http://schemas.openxmlformats.org/drawingml/2006/main" xmlns:r="http://schemas.openxmlformats.org/officeDocument/2006/relationships" xmlns:p="http://schemas.openxmlformats.org/presentationml/2006/main" show="0">
+  <p:cSld>
+    <p:spTree>
+      <p:nvGrpSpPr>
+        <p:cNvPr id="1" name=""/>
+        <p:cNvGrpSpPr/>
+        <p:nvPr/>
+      </p:nvGrpSpPr>
+      <p:grpSpPr>
+        <a:xfrm>
+          <a:off x="0" y="0"/>
+          <a:ext cx="0" cy="0"/>
+          <a:chOff x="0" y="0"/>
+          <a:chExt cx="0" cy="0"/>
+        </a:xfrm>
+      </p:grpSpPr>
+      <p:sp>
+        <p:nvSpPr>
+          <p:cNvPr id="2" name="Title 1">
+            <a:extLst>
+              <a:ext uri="{FF2B5EF4-FFF2-40B4-BE49-F238E27FC236}">
+                <a16:creationId xmlns:a16="http://schemas.microsoft.com/office/drawing/2014/main" id="{E5B9461C-1D72-7846-87B2-3D1C51EFD406}"/>
+              </a:ext>
+            </a:extLst>
+          </p:cNvPr>
+          <p:cNvSpPr>
+            <a:spLocks noGrp="1"/>
+          </p:cNvSpPr>
+          <p:nvPr>
+            <p:ph type="title"/>
+          </p:nvPr>
+        </p:nvSpPr>
+        <p:spPr/>
+        <p:txBody>
+          <a:bodyPr/>
+          <a:lstStyle/>
+          <a:p>
+            <a:r>
+              <a:rPr lang="en-US" dirty="0"/>
+              <a:t>Let’s Code</a:t>
+            </a:r>
+          </a:p>
+        </p:txBody>
+      </p:sp>
+      <p:sp>
+        <p:nvSpPr>
+          <p:cNvPr id="5" name="TextBox 4">
+            <a:extLst>
+              <a:ext uri="{FF2B5EF4-FFF2-40B4-BE49-F238E27FC236}">
+                <a16:creationId xmlns:a16="http://schemas.microsoft.com/office/drawing/2014/main" id="{F8147D93-06A3-2F44-A3FB-C8AD6003CE28}"/>
+              </a:ext>
+            </a:extLst>
+          </p:cNvPr>
+          <p:cNvSpPr txBox="1"/>
+          <p:nvPr/>
+        </p:nvSpPr>
+        <p:spPr>
+          <a:xfrm>
+            <a:off x="3454400" y="1839486"/>
+            <a:ext cx="6908800" cy="4708981"/>
+          </a:xfrm>
+          <a:prstGeom prst="rect">
+            <a:avLst/>
+          </a:prstGeom>
+          <a:noFill/>
+        </p:spPr>
+        <p:txBody>
+          <a:bodyPr wrap="square">
+            <a:spAutoFit/>
+          </a:bodyPr>
+          <a:lstStyle/>
+          <a:p>
+            <a:r>
+              <a:rPr lang="en-US" dirty="0">
+                <a:solidFill>
+                  <a:srgbClr val="CC7832"/>
+                </a:solidFill>
+                <a:effectLst/>
+                <a:latin typeface="Consolas" panose="020B0609020204030204" pitchFamily="49" charset="0"/>
+                <a:cs typeface="Consolas" panose="020B0609020204030204" pitchFamily="49" charset="0"/>
+              </a:rPr>
+              <a:t>def </a:t>
+            </a:r>
+            <a:r>
+              <a:rPr lang="en-US" dirty="0" err="1">
+                <a:solidFill>
+                  <a:srgbClr val="FFC66D"/>
+                </a:solidFill>
+                <a:effectLst/>
+                <a:latin typeface="Consolas" panose="020B0609020204030204" pitchFamily="49" charset="0"/>
+                <a:cs typeface="Consolas" panose="020B0609020204030204" pitchFamily="49" charset="0"/>
+              </a:rPr>
+              <a:t>is_auth</a:t>
+            </a:r>
+            <a:r>
+              <a:rPr lang="en-US" dirty="0">
+                <a:latin typeface="Consolas" panose="020B0609020204030204" pitchFamily="49" charset="0"/>
+                <a:cs typeface="Consolas" panose="020B0609020204030204" pitchFamily="49" charset="0"/>
+              </a:rPr>
+              <a:t>(name</a:t>
+            </a:r>
+            <a:r>
+              <a:rPr lang="en-US" dirty="0">
+                <a:solidFill>
+                  <a:srgbClr val="CC7832"/>
+                </a:solidFill>
+                <a:effectLst/>
+                <a:latin typeface="Consolas" panose="020B0609020204030204" pitchFamily="49" charset="0"/>
+                <a:cs typeface="Consolas" panose="020B0609020204030204" pitchFamily="49" charset="0"/>
+              </a:rPr>
+              <a:t>, </a:t>
+            </a:r>
+            <a:r>
+              <a:rPr lang="en-US" dirty="0">
+                <a:latin typeface="Consolas" panose="020B0609020204030204" pitchFamily="49" charset="0"/>
+                <a:cs typeface="Consolas" panose="020B0609020204030204" pitchFamily="49" charset="0"/>
+              </a:rPr>
+              <a:t>auth</a:t>
+            </a:r>
+            <a:r>
+              <a:rPr lang="en-US" dirty="0">
+                <a:solidFill>
+                  <a:srgbClr val="CC7832"/>
+                </a:solidFill>
+                <a:effectLst/>
+                <a:latin typeface="Consolas" panose="020B0609020204030204" pitchFamily="49" charset="0"/>
+                <a:cs typeface="Consolas" panose="020B0609020204030204" pitchFamily="49" charset="0"/>
+              </a:rPr>
+              <a:t>, </a:t>
+            </a:r>
+            <a:r>
+              <a:rPr lang="en-US" dirty="0" err="1">
+                <a:latin typeface="Consolas" panose="020B0609020204030204" pitchFamily="49" charset="0"/>
+                <a:cs typeface="Consolas" panose="020B0609020204030204" pitchFamily="49" charset="0"/>
+              </a:rPr>
+              <a:t>auth_dict</a:t>
+            </a:r>
+            <a:r>
+              <a:rPr lang="en-US" dirty="0">
+                <a:latin typeface="Consolas" panose="020B0609020204030204" pitchFamily="49" charset="0"/>
+                <a:cs typeface="Consolas" panose="020B0609020204030204" pitchFamily="49" charset="0"/>
+              </a:rPr>
+              <a:t>):</a:t>
+            </a:r>
+            <a:br>
+              <a:rPr lang="en-US" dirty="0">
+                <a:latin typeface="Consolas" panose="020B0609020204030204" pitchFamily="49" charset="0"/>
+                <a:cs typeface="Consolas" panose="020B0609020204030204" pitchFamily="49" charset="0"/>
+              </a:rPr>
+            </a:br>
+            <a:r>
+              <a:rPr lang="en-US" dirty="0">
+                <a:latin typeface="Consolas" panose="020B0609020204030204" pitchFamily="49" charset="0"/>
+                <a:cs typeface="Consolas" panose="020B0609020204030204" pitchFamily="49" charset="0"/>
+              </a:rPr>
+              <a:t>    </a:t>
+            </a:r>
+            <a:r>
+              <a:rPr lang="en-US" dirty="0">
+                <a:solidFill>
+                  <a:srgbClr val="CC7832"/>
+                </a:solidFill>
+                <a:effectLst/>
+                <a:latin typeface="Consolas" panose="020B0609020204030204" pitchFamily="49" charset="0"/>
+                <a:cs typeface="Consolas" panose="020B0609020204030204" pitchFamily="49" charset="0"/>
+              </a:rPr>
+              <a:t>return </a:t>
+            </a:r>
+            <a:r>
+              <a:rPr lang="en-US" dirty="0">
+                <a:latin typeface="Consolas" panose="020B0609020204030204" pitchFamily="49" charset="0"/>
+                <a:cs typeface="Consolas" panose="020B0609020204030204" pitchFamily="49" charset="0"/>
+              </a:rPr>
+              <a:t>auth </a:t>
+            </a:r>
+            <a:r>
+              <a:rPr lang="en-US" dirty="0">
+                <a:solidFill>
+                  <a:srgbClr val="CC7832"/>
+                </a:solidFill>
+                <a:effectLst/>
+                <a:latin typeface="Consolas" panose="020B0609020204030204" pitchFamily="49" charset="0"/>
+                <a:cs typeface="Consolas" panose="020B0609020204030204" pitchFamily="49" charset="0"/>
+              </a:rPr>
+              <a:t>in </a:t>
+            </a:r>
+            <a:r>
+              <a:rPr lang="en-US" dirty="0" err="1">
+                <a:latin typeface="Consolas" panose="020B0609020204030204" pitchFamily="49" charset="0"/>
+                <a:cs typeface="Consolas" panose="020B0609020204030204" pitchFamily="49" charset="0"/>
+              </a:rPr>
+              <a:t>auth_dict</a:t>
+            </a:r>
+            <a:r>
+              <a:rPr lang="en-US" dirty="0">
+                <a:latin typeface="Consolas" panose="020B0609020204030204" pitchFamily="49" charset="0"/>
+                <a:cs typeface="Consolas" panose="020B0609020204030204" pitchFamily="49" charset="0"/>
+              </a:rPr>
+              <a:t>[name]</a:t>
+            </a:r>
+            <a:br>
+              <a:rPr lang="en-US" dirty="0">
+                <a:latin typeface="Consolas" panose="020B0609020204030204" pitchFamily="49" charset="0"/>
+                <a:cs typeface="Consolas" panose="020B0609020204030204" pitchFamily="49" charset="0"/>
+              </a:rPr>
+            </a:br>
+            <a:br>
+              <a:rPr lang="en-US" dirty="0">
+                <a:latin typeface="Consolas" panose="020B0609020204030204" pitchFamily="49" charset="0"/>
+                <a:cs typeface="Consolas" panose="020B0609020204030204" pitchFamily="49" charset="0"/>
+              </a:rPr>
+            </a:br>
+            <a:r>
+              <a:rPr lang="en-US" dirty="0">
+                <a:solidFill>
+                  <a:srgbClr val="CC7832"/>
+                </a:solidFill>
+                <a:effectLst/>
+                <a:latin typeface="Consolas" panose="020B0609020204030204" pitchFamily="49" charset="0"/>
+                <a:cs typeface="Consolas" panose="020B0609020204030204" pitchFamily="49" charset="0"/>
+              </a:rPr>
+              <a:t>def </a:t>
+            </a:r>
+            <a:r>
+              <a:rPr lang="en-US" dirty="0" err="1">
+                <a:solidFill>
+                  <a:srgbClr val="FFC66D"/>
+                </a:solidFill>
+                <a:effectLst/>
+                <a:latin typeface="Consolas" panose="020B0609020204030204" pitchFamily="49" charset="0"/>
+                <a:cs typeface="Consolas" panose="020B0609020204030204" pitchFamily="49" charset="0"/>
+              </a:rPr>
+              <a:t>add_auth</a:t>
+            </a:r>
+            <a:r>
+              <a:rPr lang="en-US" dirty="0">
+                <a:latin typeface="Consolas" panose="020B0609020204030204" pitchFamily="49" charset="0"/>
+                <a:cs typeface="Consolas" panose="020B0609020204030204" pitchFamily="49" charset="0"/>
+              </a:rPr>
+              <a:t>(name</a:t>
+            </a:r>
+            <a:r>
+              <a:rPr lang="en-US" dirty="0">
+                <a:solidFill>
+                  <a:srgbClr val="CC7832"/>
+                </a:solidFill>
+                <a:effectLst/>
+                <a:latin typeface="Consolas" panose="020B0609020204030204" pitchFamily="49" charset="0"/>
+                <a:cs typeface="Consolas" panose="020B0609020204030204" pitchFamily="49" charset="0"/>
+              </a:rPr>
+              <a:t>,  </a:t>
+            </a:r>
+            <a:r>
+              <a:rPr lang="en-US" dirty="0">
+                <a:latin typeface="Consolas" panose="020B0609020204030204" pitchFamily="49" charset="0"/>
+                <a:cs typeface="Consolas" panose="020B0609020204030204" pitchFamily="49" charset="0"/>
+              </a:rPr>
+              <a:t>auth</a:t>
+            </a:r>
+            <a:r>
+              <a:rPr lang="en-US" dirty="0">
+                <a:solidFill>
+                  <a:srgbClr val="CC7832"/>
+                </a:solidFill>
+                <a:effectLst/>
+                <a:latin typeface="Consolas" panose="020B0609020204030204" pitchFamily="49" charset="0"/>
+                <a:cs typeface="Consolas" panose="020B0609020204030204" pitchFamily="49" charset="0"/>
+              </a:rPr>
+              <a:t>, </a:t>
+            </a:r>
+            <a:r>
+              <a:rPr lang="en-US" dirty="0" err="1">
+                <a:latin typeface="Consolas" panose="020B0609020204030204" pitchFamily="49" charset="0"/>
+                <a:cs typeface="Consolas" panose="020B0609020204030204" pitchFamily="49" charset="0"/>
+              </a:rPr>
+              <a:t>auth_dict</a:t>
+            </a:r>
+            <a:r>
+              <a:rPr lang="en-US" dirty="0">
+                <a:latin typeface="Consolas" panose="020B0609020204030204" pitchFamily="49" charset="0"/>
+                <a:cs typeface="Consolas" panose="020B0609020204030204" pitchFamily="49" charset="0"/>
+              </a:rPr>
+              <a:t>):</a:t>
+            </a:r>
+            <a:br>
+              <a:rPr lang="en-US" dirty="0">
+                <a:latin typeface="Consolas" panose="020B0609020204030204" pitchFamily="49" charset="0"/>
+                <a:cs typeface="Consolas" panose="020B0609020204030204" pitchFamily="49" charset="0"/>
+              </a:rPr>
+            </a:br>
+            <a:r>
+              <a:rPr lang="en-US" dirty="0">
+                <a:latin typeface="Consolas" panose="020B0609020204030204" pitchFamily="49" charset="0"/>
+                <a:cs typeface="Consolas" panose="020B0609020204030204" pitchFamily="49" charset="0"/>
+              </a:rPr>
+              <a:t>    </a:t>
+            </a:r>
+            <a:r>
+              <a:rPr lang="en-US" dirty="0">
+                <a:solidFill>
+                  <a:srgbClr val="CC7832"/>
+                </a:solidFill>
+                <a:effectLst/>
+                <a:latin typeface="Consolas" panose="020B0609020204030204" pitchFamily="49" charset="0"/>
+                <a:cs typeface="Consolas" panose="020B0609020204030204" pitchFamily="49" charset="0"/>
+              </a:rPr>
+              <a:t>if not </a:t>
+            </a:r>
+            <a:r>
+              <a:rPr lang="en-US" dirty="0" err="1">
+                <a:latin typeface="Consolas" panose="020B0609020204030204" pitchFamily="49" charset="0"/>
+                <a:cs typeface="Consolas" panose="020B0609020204030204" pitchFamily="49" charset="0"/>
+              </a:rPr>
+              <a:t>is_auth</a:t>
+            </a:r>
+            <a:r>
+              <a:rPr lang="en-US" dirty="0">
+                <a:latin typeface="Consolas" panose="020B0609020204030204" pitchFamily="49" charset="0"/>
+                <a:cs typeface="Consolas" panose="020B0609020204030204" pitchFamily="49" charset="0"/>
+              </a:rPr>
+              <a:t>(name</a:t>
+            </a:r>
+            <a:r>
+              <a:rPr lang="en-US" dirty="0">
+                <a:solidFill>
+                  <a:srgbClr val="CC7832"/>
+                </a:solidFill>
+                <a:effectLst/>
+                <a:latin typeface="Consolas" panose="020B0609020204030204" pitchFamily="49" charset="0"/>
+                <a:cs typeface="Consolas" panose="020B0609020204030204" pitchFamily="49" charset="0"/>
+              </a:rPr>
+              <a:t>, </a:t>
+            </a:r>
+            <a:r>
+              <a:rPr lang="en-US" dirty="0">
+                <a:latin typeface="Consolas" panose="020B0609020204030204" pitchFamily="49" charset="0"/>
+                <a:cs typeface="Consolas" panose="020B0609020204030204" pitchFamily="49" charset="0"/>
+              </a:rPr>
+              <a:t>auth</a:t>
+            </a:r>
+            <a:r>
+              <a:rPr lang="en-US" dirty="0">
+                <a:solidFill>
+                  <a:srgbClr val="CC7832"/>
+                </a:solidFill>
+                <a:effectLst/>
+                <a:latin typeface="Consolas" panose="020B0609020204030204" pitchFamily="49" charset="0"/>
+                <a:cs typeface="Consolas" panose="020B0609020204030204" pitchFamily="49" charset="0"/>
+              </a:rPr>
+              <a:t>, </a:t>
+            </a:r>
+            <a:r>
+              <a:rPr lang="en-US" dirty="0" err="1">
+                <a:latin typeface="Consolas" panose="020B0609020204030204" pitchFamily="49" charset="0"/>
+                <a:cs typeface="Consolas" panose="020B0609020204030204" pitchFamily="49" charset="0"/>
+              </a:rPr>
+              <a:t>auth_dict</a:t>
+            </a:r>
+            <a:r>
+              <a:rPr lang="en-US" dirty="0">
+                <a:latin typeface="Consolas" panose="020B0609020204030204" pitchFamily="49" charset="0"/>
+                <a:cs typeface="Consolas" panose="020B0609020204030204" pitchFamily="49" charset="0"/>
+              </a:rPr>
+              <a:t>):</a:t>
+            </a:r>
+            <a:br>
+              <a:rPr lang="en-US" dirty="0">
+                <a:latin typeface="Consolas" panose="020B0609020204030204" pitchFamily="49" charset="0"/>
+                <a:cs typeface="Consolas" panose="020B0609020204030204" pitchFamily="49" charset="0"/>
+              </a:rPr>
+            </a:br>
+            <a:r>
+              <a:rPr lang="en-US" dirty="0">
+                <a:latin typeface="Consolas" panose="020B0609020204030204" pitchFamily="49" charset="0"/>
+                <a:cs typeface="Consolas" panose="020B0609020204030204" pitchFamily="49" charset="0"/>
+              </a:rPr>
+              <a:t>        </a:t>
+            </a:r>
+            <a:r>
+              <a:rPr lang="en-US" dirty="0" err="1">
+                <a:latin typeface="Consolas" panose="020B0609020204030204" pitchFamily="49" charset="0"/>
+                <a:cs typeface="Consolas" panose="020B0609020204030204" pitchFamily="49" charset="0"/>
+              </a:rPr>
+              <a:t>auth_dict</a:t>
+            </a:r>
+            <a:r>
+              <a:rPr lang="en-US" dirty="0">
+                <a:latin typeface="Consolas" panose="020B0609020204030204" pitchFamily="49" charset="0"/>
+                <a:cs typeface="Consolas" panose="020B0609020204030204" pitchFamily="49" charset="0"/>
+              </a:rPr>
+              <a:t>[name].append(auth)</a:t>
+            </a:r>
+          </a:p>
+          <a:p>
+            <a:r>
+              <a:rPr lang="en-US" dirty="0">
+                <a:solidFill>
+                  <a:srgbClr val="CC7832"/>
+                </a:solidFill>
+                <a:latin typeface="Consolas" panose="020B0609020204030204" pitchFamily="49" charset="0"/>
+                <a:cs typeface="Consolas" panose="020B0609020204030204" pitchFamily="49" charset="0"/>
+              </a:rPr>
+              <a:t>	else</a:t>
+            </a:r>
+            <a:r>
+              <a:rPr lang="en-US" dirty="0">
+                <a:latin typeface="Consolas" panose="020B0609020204030204" pitchFamily="49" charset="0"/>
+                <a:cs typeface="Consolas" panose="020B0609020204030204" pitchFamily="49" charset="0"/>
+              </a:rPr>
+              <a:t>:</a:t>
+            </a:r>
+            <a:br>
+              <a:rPr lang="en-US" dirty="0">
+                <a:latin typeface="Consolas" panose="020B0609020204030204" pitchFamily="49" charset="0"/>
+                <a:cs typeface="Consolas" panose="020B0609020204030204" pitchFamily="49" charset="0"/>
+              </a:rPr>
+            </a:br>
+            <a:r>
+              <a:rPr lang="en-US" dirty="0">
+                <a:latin typeface="Consolas" panose="020B0609020204030204" pitchFamily="49" charset="0"/>
+                <a:cs typeface="Consolas" panose="020B0609020204030204" pitchFamily="49" charset="0"/>
+              </a:rPr>
+              <a:t>    	 </a:t>
+            </a:r>
+            <a:r>
+              <a:rPr lang="en-US" dirty="0" err="1">
+                <a:latin typeface="Consolas" panose="020B0609020204030204" pitchFamily="49" charset="0"/>
+                <a:cs typeface="Consolas" panose="020B0609020204030204" pitchFamily="49" charset="0"/>
+              </a:rPr>
+              <a:t>auth_dict</a:t>
+            </a:r>
+            <a:r>
+              <a:rPr lang="en-US" dirty="0">
+                <a:latin typeface="Consolas" panose="020B0609020204030204" pitchFamily="49" charset="0"/>
+                <a:cs typeface="Consolas" panose="020B0609020204030204" pitchFamily="49" charset="0"/>
+              </a:rPr>
+              <a:t>[name] = [auth]</a:t>
+            </a:r>
+            <a:br>
+              <a:rPr lang="en-US" dirty="0">
+                <a:latin typeface="Consolas" panose="020B0609020204030204" pitchFamily="49" charset="0"/>
+                <a:cs typeface="Consolas" panose="020B0609020204030204" pitchFamily="49" charset="0"/>
+              </a:rPr>
+            </a:br>
+            <a:br>
+              <a:rPr lang="en-US" dirty="0">
+                <a:latin typeface="Consolas" panose="020B0609020204030204" pitchFamily="49" charset="0"/>
+                <a:cs typeface="Consolas" panose="020B0609020204030204" pitchFamily="49" charset="0"/>
+              </a:rPr>
+            </a:br>
+            <a:r>
+              <a:rPr lang="en-US" dirty="0">
+                <a:solidFill>
+                  <a:srgbClr val="CC7832"/>
+                </a:solidFill>
+                <a:effectLst/>
+                <a:latin typeface="Consolas" panose="020B0609020204030204" pitchFamily="49" charset="0"/>
+                <a:cs typeface="Consolas" panose="020B0609020204030204" pitchFamily="49" charset="0"/>
+              </a:rPr>
+              <a:t>def </a:t>
+            </a:r>
+            <a:r>
+              <a:rPr lang="en-US" dirty="0" err="1">
+                <a:solidFill>
+                  <a:srgbClr val="FFC66D"/>
+                </a:solidFill>
+                <a:effectLst/>
+                <a:latin typeface="Consolas" panose="020B0609020204030204" pitchFamily="49" charset="0"/>
+                <a:cs typeface="Consolas" panose="020B0609020204030204" pitchFamily="49" charset="0"/>
+              </a:rPr>
+              <a:t>remove_auth</a:t>
+            </a:r>
+            <a:r>
+              <a:rPr lang="en-US" dirty="0">
+                <a:latin typeface="Consolas" panose="020B0609020204030204" pitchFamily="49" charset="0"/>
+                <a:cs typeface="Consolas" panose="020B0609020204030204" pitchFamily="49" charset="0"/>
+              </a:rPr>
+              <a:t>(name</a:t>
+            </a:r>
+            <a:r>
+              <a:rPr lang="en-US" dirty="0">
+                <a:solidFill>
+                  <a:srgbClr val="CC7832"/>
+                </a:solidFill>
+                <a:effectLst/>
+                <a:latin typeface="Consolas" panose="020B0609020204030204" pitchFamily="49" charset="0"/>
+                <a:cs typeface="Consolas" panose="020B0609020204030204" pitchFamily="49" charset="0"/>
+              </a:rPr>
+              <a:t>, </a:t>
+            </a:r>
+            <a:r>
+              <a:rPr lang="en-US" dirty="0">
+                <a:latin typeface="Consolas" panose="020B0609020204030204" pitchFamily="49" charset="0"/>
+                <a:cs typeface="Consolas" panose="020B0609020204030204" pitchFamily="49" charset="0"/>
+              </a:rPr>
+              <a:t>auth</a:t>
+            </a:r>
+            <a:r>
+              <a:rPr lang="en-US" dirty="0">
+                <a:solidFill>
+                  <a:srgbClr val="CC7832"/>
+                </a:solidFill>
+                <a:effectLst/>
+                <a:latin typeface="Consolas" panose="020B0609020204030204" pitchFamily="49" charset="0"/>
+                <a:cs typeface="Consolas" panose="020B0609020204030204" pitchFamily="49" charset="0"/>
+              </a:rPr>
+              <a:t>, </a:t>
+            </a:r>
+            <a:r>
+              <a:rPr lang="en-US" dirty="0" err="1">
+                <a:latin typeface="Consolas" panose="020B0609020204030204" pitchFamily="49" charset="0"/>
+                <a:cs typeface="Consolas" panose="020B0609020204030204" pitchFamily="49" charset="0"/>
+              </a:rPr>
+              <a:t>auth_dict</a:t>
+            </a:r>
+            <a:r>
+              <a:rPr lang="en-US" dirty="0">
+                <a:latin typeface="Consolas" panose="020B0609020204030204" pitchFamily="49" charset="0"/>
+                <a:cs typeface="Consolas" panose="020B0609020204030204" pitchFamily="49" charset="0"/>
+              </a:rPr>
+              <a:t>):</a:t>
+            </a:r>
+            <a:br>
+              <a:rPr lang="en-US" dirty="0">
+                <a:latin typeface="Consolas" panose="020B0609020204030204" pitchFamily="49" charset="0"/>
+                <a:cs typeface="Consolas" panose="020B0609020204030204" pitchFamily="49" charset="0"/>
+              </a:rPr>
+            </a:br>
+            <a:r>
+              <a:rPr lang="en-US" dirty="0">
+                <a:latin typeface="Consolas" panose="020B0609020204030204" pitchFamily="49" charset="0"/>
+                <a:cs typeface="Consolas" panose="020B0609020204030204" pitchFamily="49" charset="0"/>
+              </a:rPr>
+              <a:t>    </a:t>
+            </a:r>
+            <a:r>
+              <a:rPr lang="en-US" dirty="0">
+                <a:solidFill>
+                  <a:srgbClr val="CC7832"/>
+                </a:solidFill>
+                <a:effectLst/>
+                <a:latin typeface="Consolas" panose="020B0609020204030204" pitchFamily="49" charset="0"/>
+                <a:cs typeface="Consolas" panose="020B0609020204030204" pitchFamily="49" charset="0"/>
+              </a:rPr>
+              <a:t>if </a:t>
+            </a:r>
+            <a:r>
+              <a:rPr lang="en-US" dirty="0" err="1">
+                <a:latin typeface="Consolas" panose="020B0609020204030204" pitchFamily="49" charset="0"/>
+                <a:cs typeface="Consolas" panose="020B0609020204030204" pitchFamily="49" charset="0"/>
+              </a:rPr>
+              <a:t>is_auth</a:t>
+            </a:r>
+            <a:r>
+              <a:rPr lang="en-US" dirty="0">
+                <a:latin typeface="Consolas" panose="020B0609020204030204" pitchFamily="49" charset="0"/>
+                <a:cs typeface="Consolas" panose="020B0609020204030204" pitchFamily="49" charset="0"/>
+              </a:rPr>
+              <a:t>(name</a:t>
+            </a:r>
+            <a:r>
+              <a:rPr lang="en-US" dirty="0">
+                <a:solidFill>
+                  <a:srgbClr val="CC7832"/>
+                </a:solidFill>
+                <a:effectLst/>
+                <a:latin typeface="Consolas" panose="020B0609020204030204" pitchFamily="49" charset="0"/>
+                <a:cs typeface="Consolas" panose="020B0609020204030204" pitchFamily="49" charset="0"/>
+              </a:rPr>
+              <a:t>, </a:t>
+            </a:r>
+            <a:r>
+              <a:rPr lang="en-US" dirty="0">
+                <a:latin typeface="Consolas" panose="020B0609020204030204" pitchFamily="49" charset="0"/>
+                <a:cs typeface="Consolas" panose="020B0609020204030204" pitchFamily="49" charset="0"/>
+              </a:rPr>
+              <a:t>auth</a:t>
+            </a:r>
+            <a:r>
+              <a:rPr lang="en-US" dirty="0">
+                <a:solidFill>
+                  <a:srgbClr val="CC7832"/>
+                </a:solidFill>
+                <a:effectLst/>
+                <a:latin typeface="Consolas" panose="020B0609020204030204" pitchFamily="49" charset="0"/>
+                <a:cs typeface="Consolas" panose="020B0609020204030204" pitchFamily="49" charset="0"/>
+              </a:rPr>
+              <a:t>, </a:t>
+            </a:r>
+            <a:r>
+              <a:rPr lang="en-US" dirty="0" err="1">
+                <a:latin typeface="Consolas" panose="020B0609020204030204" pitchFamily="49" charset="0"/>
+                <a:cs typeface="Consolas" panose="020B0609020204030204" pitchFamily="49" charset="0"/>
+              </a:rPr>
+              <a:t>auth_dict</a:t>
+            </a:r>
+            <a:r>
+              <a:rPr lang="en-US" dirty="0">
+                <a:latin typeface="Consolas" panose="020B0609020204030204" pitchFamily="49" charset="0"/>
+                <a:cs typeface="Consolas" panose="020B0609020204030204" pitchFamily="49" charset="0"/>
+              </a:rPr>
+              <a:t>):</a:t>
+            </a:r>
+            <a:br>
+              <a:rPr lang="en-US" dirty="0">
+                <a:latin typeface="Consolas" panose="020B0609020204030204" pitchFamily="49" charset="0"/>
+                <a:cs typeface="Consolas" panose="020B0609020204030204" pitchFamily="49" charset="0"/>
+              </a:rPr>
+            </a:br>
+            <a:r>
+              <a:rPr lang="en-US" dirty="0">
+                <a:latin typeface="Consolas" panose="020B0609020204030204" pitchFamily="49" charset="0"/>
+                <a:cs typeface="Consolas" panose="020B0609020204030204" pitchFamily="49" charset="0"/>
+              </a:rPr>
+              <a:t>        </a:t>
+            </a:r>
+            <a:r>
+              <a:rPr lang="en-US" dirty="0" err="1">
+                <a:latin typeface="Consolas" panose="020B0609020204030204" pitchFamily="49" charset="0"/>
+                <a:cs typeface="Consolas" panose="020B0609020204030204" pitchFamily="49" charset="0"/>
+              </a:rPr>
+              <a:t>auth_dict</a:t>
+            </a:r>
+            <a:r>
+              <a:rPr lang="en-US" dirty="0">
+                <a:latin typeface="Consolas" panose="020B0609020204030204" pitchFamily="49" charset="0"/>
+                <a:cs typeface="Consolas" panose="020B0609020204030204" pitchFamily="49" charset="0"/>
+              </a:rPr>
+              <a:t>[name].remove(auth)</a:t>
+            </a:r>
+            <a:br>
+              <a:rPr lang="en-US" dirty="0">
+                <a:latin typeface="Consolas" panose="020B0609020204030204" pitchFamily="49" charset="0"/>
+                <a:cs typeface="Consolas" panose="020B0609020204030204" pitchFamily="49" charset="0"/>
+              </a:rPr>
+            </a:br>
+            <a:br>
+              <a:rPr lang="en-US" dirty="0">
+                <a:latin typeface="Consolas" panose="020B0609020204030204" pitchFamily="49" charset="0"/>
+                <a:cs typeface="Consolas" panose="020B0609020204030204" pitchFamily="49" charset="0"/>
+              </a:rPr>
+            </a:br>
+            <a:r>
+              <a:rPr lang="en-US" dirty="0">
+                <a:solidFill>
+                  <a:srgbClr val="CC7832"/>
+                </a:solidFill>
+                <a:effectLst/>
+                <a:latin typeface="Consolas" panose="020B0609020204030204" pitchFamily="49" charset="0"/>
+                <a:cs typeface="Consolas" panose="020B0609020204030204" pitchFamily="49" charset="0"/>
+              </a:rPr>
+              <a:t>def </a:t>
+            </a:r>
+            <a:r>
+              <a:rPr lang="en-US" dirty="0" err="1">
+                <a:solidFill>
+                  <a:srgbClr val="FFC66D"/>
+                </a:solidFill>
+                <a:effectLst/>
+                <a:latin typeface="Consolas" panose="020B0609020204030204" pitchFamily="49" charset="0"/>
+                <a:cs typeface="Consolas" panose="020B0609020204030204" pitchFamily="49" charset="0"/>
+              </a:rPr>
+              <a:t>clear_fighter</a:t>
+            </a:r>
+            <a:r>
+              <a:rPr lang="en-US" dirty="0">
+                <a:latin typeface="Consolas" panose="020B0609020204030204" pitchFamily="49" charset="0"/>
+                <a:cs typeface="Consolas" panose="020B0609020204030204" pitchFamily="49" charset="0"/>
+              </a:rPr>
+              <a:t>(name</a:t>
+            </a:r>
+            <a:r>
+              <a:rPr lang="en-US" dirty="0">
+                <a:solidFill>
+                  <a:srgbClr val="CC7832"/>
+                </a:solidFill>
+                <a:effectLst/>
+                <a:latin typeface="Consolas" panose="020B0609020204030204" pitchFamily="49" charset="0"/>
+                <a:cs typeface="Consolas" panose="020B0609020204030204" pitchFamily="49" charset="0"/>
+              </a:rPr>
+              <a:t>, </a:t>
+            </a:r>
+            <a:r>
+              <a:rPr lang="en-US" dirty="0" err="1">
+                <a:latin typeface="Consolas" panose="020B0609020204030204" pitchFamily="49" charset="0"/>
+                <a:cs typeface="Consolas" panose="020B0609020204030204" pitchFamily="49" charset="0"/>
+              </a:rPr>
+              <a:t>auth_dict</a:t>
+            </a:r>
+            <a:r>
+              <a:rPr lang="en-US" dirty="0">
+                <a:latin typeface="Consolas" panose="020B0609020204030204" pitchFamily="49" charset="0"/>
+                <a:cs typeface="Consolas" panose="020B0609020204030204" pitchFamily="49" charset="0"/>
+              </a:rPr>
+              <a:t>):</a:t>
+            </a:r>
+            <a:br>
+              <a:rPr lang="en-US" dirty="0">
+                <a:latin typeface="Consolas" panose="020B0609020204030204" pitchFamily="49" charset="0"/>
+                <a:cs typeface="Consolas" panose="020B0609020204030204" pitchFamily="49" charset="0"/>
+              </a:rPr>
+            </a:br>
+            <a:r>
+              <a:rPr lang="en-US" dirty="0">
+                <a:latin typeface="Consolas" panose="020B0609020204030204" pitchFamily="49" charset="0"/>
+                <a:cs typeface="Consolas" panose="020B0609020204030204" pitchFamily="49" charset="0"/>
+              </a:rPr>
+              <a:t> 	</a:t>
+            </a:r>
+            <a:r>
+              <a:rPr lang="en-US" dirty="0">
+                <a:solidFill>
+                  <a:srgbClr val="CC7832"/>
+                </a:solidFill>
+                <a:latin typeface="Consolas" panose="020B0609020204030204" pitchFamily="49" charset="0"/>
+                <a:cs typeface="Consolas" panose="020B0609020204030204" pitchFamily="49" charset="0"/>
+              </a:rPr>
+              <a:t>return</a:t>
+            </a:r>
+            <a:r>
+              <a:rPr lang="en-US" dirty="0">
+                <a:latin typeface="Consolas" panose="020B0609020204030204" pitchFamily="49" charset="0"/>
+                <a:cs typeface="Consolas" panose="020B0609020204030204" pitchFamily="49" charset="0"/>
+              </a:rPr>
+              <a:t> </a:t>
+            </a:r>
+            <a:r>
+              <a:rPr lang="en-US" dirty="0" err="1">
+                <a:latin typeface="Consolas" panose="020B0609020204030204" pitchFamily="49" charset="0"/>
+                <a:cs typeface="Consolas" panose="020B0609020204030204" pitchFamily="49" charset="0"/>
+              </a:rPr>
+              <a:t>auth_dict.pop</a:t>
+            </a:r>
+            <a:r>
+              <a:rPr lang="en-US" dirty="0">
+                <a:latin typeface="Consolas" panose="020B0609020204030204" pitchFamily="49" charset="0"/>
+                <a:cs typeface="Consolas" panose="020B0609020204030204" pitchFamily="49" charset="0"/>
+              </a:rPr>
+              <a:t>(name, None)</a:t>
+            </a:r>
+          </a:p>
+        </p:txBody>
+      </p:sp>
+    </p:spTree>
+    <p:extLst>
+      <p:ext uri="{BB962C8B-B14F-4D97-AF65-F5344CB8AC3E}">
+        <p14:creationId xmlns:p14="http://schemas.microsoft.com/office/powerpoint/2010/main" val="282863079"/>
+      </p:ext>
+    </p:extLst>
+  </p:cSld>
+  <p:clrMapOvr>
+    <a:masterClrMapping/>
+  </p:clrMapOvr>
+  <mc:AlternateContent xmlns:mc="http://schemas.openxmlformats.org/markup-compatibility/2006" xmlns:p14="http://schemas.microsoft.com/office/powerpoint/2010/main">
+    <mc:Choice Requires="p14">
+      <p:transition p14:dur="300">
+        <p:fade/>
+      </p:transition>
+    </mc:Choice>
+    <mc:Fallback xmlns="">
+      <p:transition>
+        <p:fade/>
+      </p:transition>
+    </mc:Fallback>
+  </mc:AlternateContent>
+</p:sld>
+</file>
+
 <file path=ppt/slides/slide2.xml><?xml version="1.0" encoding="utf-8"?>
+<p:sld xmlns:a="http://schemas.openxmlformats.org/drawingml/2006/main" xmlns:r="http://schemas.openxmlformats.org/officeDocument/2006/relationships" xmlns:p="http://schemas.openxmlformats.org/presentationml/2006/main">
+  <p:cSld>
+    <p:spTree>
+      <p:nvGrpSpPr>
+        <p:cNvPr id="1" name=""/>
+        <p:cNvGrpSpPr/>
+        <p:nvPr/>
+      </p:nvGrpSpPr>
+      <p:grpSpPr>
+        <a:xfrm>
+          <a:off x="0" y="0"/>
+          <a:ext cx="0" cy="0"/>
+          <a:chOff x="0" y="0"/>
+          <a:chExt cx="0" cy="0"/>
+        </a:xfrm>
+      </p:grpSpPr>
+      <p:sp>
+        <p:nvSpPr>
+          <p:cNvPr id="4" name="Title 3">
+            <a:extLst>
+              <a:ext uri="{FF2B5EF4-FFF2-40B4-BE49-F238E27FC236}">
+                <a16:creationId xmlns:a16="http://schemas.microsoft.com/office/drawing/2014/main" id="{119AD8F2-D5DB-A84B-A5B3-F7935E3E6D1D}"/>
+              </a:ext>
+            </a:extLst>
+          </p:cNvPr>
+          <p:cNvSpPr>
+            <a:spLocks noGrp="1"/>
+          </p:cNvSpPr>
+          <p:nvPr>
+            <p:ph type="title"/>
+          </p:nvPr>
+        </p:nvSpPr>
+        <p:spPr>
+          <a:xfrm>
+            <a:off x="628076" y="607804"/>
+            <a:ext cx="5642096" cy="916848"/>
+          </a:xfrm>
+        </p:spPr>
+        <p:txBody>
+          <a:bodyPr/>
+          <a:lstStyle/>
+          <a:p>
+            <a:r>
+              <a:rPr lang="en-US" dirty="0"/>
+              <a:t>Announcements</a:t>
+            </a:r>
+          </a:p>
+        </p:txBody>
+      </p:sp>
+      <p:sp>
+        <p:nvSpPr>
+          <p:cNvPr id="5" name="Text Placeholder 4">
+            <a:extLst>
+              <a:ext uri="{FF2B5EF4-FFF2-40B4-BE49-F238E27FC236}">
+                <a16:creationId xmlns:a16="http://schemas.microsoft.com/office/drawing/2014/main" id="{1BBD0DB5-379A-304F-9307-E7B1A89B08F7}"/>
+              </a:ext>
+            </a:extLst>
+          </p:cNvPr>
+          <p:cNvSpPr>
+            <a:spLocks noGrp="1"/>
+          </p:cNvSpPr>
+          <p:nvPr>
+            <p:ph type="body" idx="1"/>
+          </p:nvPr>
+        </p:nvSpPr>
+        <p:spPr>
+          <a:xfrm>
+            <a:off x="628075" y="1647163"/>
+            <a:ext cx="8395419" cy="4379259"/>
+          </a:xfrm>
+        </p:spPr>
+        <p:txBody>
+          <a:bodyPr/>
+          <a:lstStyle/>
+          <a:p>
+            <a:pPr marL="930762" lvl="1" indent="0">
+              <a:buNone/>
+            </a:pPr>
+            <a:endParaRPr lang="en-US" dirty="0"/>
+          </a:p>
+          <a:p>
+            <a:r>
+              <a:rPr lang="en-US" dirty="0"/>
+              <a:t>Reminder – readings are due </a:t>
+            </a:r>
+            <a:r>
+              <a:rPr lang="en-US" b="1" dirty="0"/>
+              <a:t>before</a:t>
+            </a:r>
+            <a:r>
+              <a:rPr lang="en-US" dirty="0"/>
+              <a:t> lecture</a:t>
+            </a:r>
+          </a:p>
+          <a:p>
+            <a:pPr lvl="1"/>
+            <a:r>
+              <a:rPr lang="en-US" dirty="0"/>
+              <a:t>You don’t have to do all of it - challenge problems can be challenging…</a:t>
+            </a:r>
+          </a:p>
+          <a:p>
+            <a:pPr lvl="1"/>
+            <a:r>
+              <a:rPr lang="en-US" dirty="0"/>
+              <a:t>You can return to them. </a:t>
+            </a:r>
+          </a:p>
+          <a:p>
+            <a:pPr lvl="1"/>
+            <a:r>
+              <a:rPr lang="en-US" dirty="0"/>
+              <a:t>We start off each lecture with a quiz from your reading! </a:t>
+            </a:r>
+          </a:p>
+          <a:p>
+            <a:r>
+              <a:rPr lang="en-US" dirty="0"/>
+              <a:t>Make sure to review knowledge checks and spread out their use! </a:t>
+            </a:r>
+          </a:p>
+          <a:p>
+            <a:pPr lvl="1"/>
+            <a:endParaRPr lang="en-US" dirty="0"/>
+          </a:p>
+          <a:p>
+            <a:r>
+              <a:rPr lang="en-US" dirty="0"/>
+              <a:t>LABS – are mostly empty. If can go to them to get help, and they should be full. </a:t>
+            </a:r>
+          </a:p>
+          <a:p>
+            <a:endParaRPr lang="en-US" dirty="0"/>
+          </a:p>
+          <a:p>
+            <a:endParaRPr lang="en-US" dirty="0"/>
+          </a:p>
+        </p:txBody>
+      </p:sp>
+      <p:sp>
+        <p:nvSpPr>
+          <p:cNvPr id="6" name="TextBox 5">
+            <a:extLst>
+              <a:ext uri="{FF2B5EF4-FFF2-40B4-BE49-F238E27FC236}">
+                <a16:creationId xmlns:a16="http://schemas.microsoft.com/office/drawing/2014/main" id="{32A3B87A-BBC0-704B-AC99-3984206450D5}"/>
+              </a:ext>
+            </a:extLst>
+          </p:cNvPr>
+          <p:cNvSpPr txBox="1"/>
+          <p:nvPr/>
+        </p:nvSpPr>
+        <p:spPr>
+          <a:xfrm>
+            <a:off x="9744412" y="2150737"/>
+            <a:ext cx="3892958" cy="2417650"/>
+          </a:xfrm>
+          <a:prstGeom prst="rect">
+            <a:avLst/>
+          </a:prstGeom>
+          <a:noFill/>
+        </p:spPr>
+        <p:txBody>
+          <a:bodyPr wrap="square" rtlCol="0">
+            <a:spAutoFit/>
+          </a:bodyPr>
+          <a:lstStyle/>
+          <a:p>
+            <a:r>
+              <a:rPr lang="en-US" sz="3022" dirty="0" err="1"/>
+              <a:t>Todo</a:t>
+            </a:r>
+            <a:r>
+              <a:rPr lang="en-US" sz="3022" dirty="0"/>
+              <a:t>:</a:t>
+            </a:r>
+          </a:p>
+          <a:p>
+            <a:r>
+              <a:rPr lang="en-US" sz="3022" dirty="0"/>
+              <a:t>Start labs right away</a:t>
+            </a:r>
+          </a:p>
+          <a:p>
+            <a:endParaRPr lang="en-US" sz="3022" dirty="0"/>
+          </a:p>
+          <a:p>
+            <a:endParaRPr lang="en-US" sz="3022" dirty="0"/>
+          </a:p>
+          <a:p>
+            <a:endParaRPr lang="en-US" sz="3022" dirty="0"/>
+          </a:p>
+        </p:txBody>
+      </p:sp>
+      <p:sp>
+        <p:nvSpPr>
+          <p:cNvPr id="3" name="TextBox 2">
+            <a:extLst>
+              <a:ext uri="{FF2B5EF4-FFF2-40B4-BE49-F238E27FC236}">
+                <a16:creationId xmlns:a16="http://schemas.microsoft.com/office/drawing/2014/main" id="{219403AF-FCA0-4FAD-B2CD-E3D24CF8DD27}"/>
+              </a:ext>
+            </a:extLst>
+          </p:cNvPr>
+          <p:cNvSpPr txBox="1"/>
+          <p:nvPr/>
+        </p:nvSpPr>
+        <p:spPr>
+          <a:xfrm>
+            <a:off x="628076" y="5487214"/>
+            <a:ext cx="11926781" cy="1631216"/>
+          </a:xfrm>
+          <a:prstGeom prst="rect">
+            <a:avLst/>
+          </a:prstGeom>
+          <a:noFill/>
+        </p:spPr>
+        <p:txBody>
+          <a:bodyPr wrap="square" rtlCol="0">
+            <a:spAutoFit/>
+          </a:bodyPr>
+          <a:lstStyle/>
+          <a:p>
+            <a:r>
+              <a:rPr lang="en-US" dirty="0"/>
+              <a:t>CS 164 – Next Course In Sequence, also consider CS 220 (math and stats especially) </a:t>
+            </a:r>
+          </a:p>
+          <a:p>
+            <a:pPr marL="342900" indent="-342900">
+              <a:buFont typeface="Arial" panose="020B0604020202020204" pitchFamily="34" charset="0"/>
+              <a:buChar char="•"/>
+            </a:pPr>
+            <a:r>
+              <a:rPr lang="en-US" dirty="0"/>
+              <a:t>CO Jobs Report 2021 – 77% of *all* new jobs in Colorado require programming</a:t>
+            </a:r>
+          </a:p>
+          <a:p>
+            <a:pPr marL="342900" indent="-342900">
+              <a:buFont typeface="Arial" panose="020B0604020202020204" pitchFamily="34" charset="0"/>
+              <a:buChar char="•"/>
+            </a:pPr>
+            <a:r>
+              <a:rPr lang="en-US" dirty="0"/>
+              <a:t>60% of all STEM jobs requires *advanced* (200-300 level) </a:t>
+            </a:r>
+          </a:p>
+          <a:p>
+            <a:pPr marL="342900" indent="-342900">
+              <a:buFont typeface="Arial" panose="020B0604020202020204" pitchFamily="34" charset="0"/>
+              <a:buChar char="•"/>
+            </a:pPr>
+            <a:r>
+              <a:rPr lang="en-US" dirty="0"/>
+              <a:t>31% of all Bachelor of Arts degree titled jobs also required coding skills </a:t>
+            </a:r>
+          </a:p>
+          <a:p>
+            <a:pPr marL="342900" indent="-342900">
+              <a:buFont typeface="Arial" panose="020B0604020202020204" pitchFamily="34" charset="0"/>
+              <a:buChar char="•"/>
+            </a:pPr>
+            <a:r>
+              <a:rPr lang="en-US" dirty="0"/>
+              <a:t>2016 Report found on average jobs that require coding skills paid $22,000 more</a:t>
+            </a:r>
+          </a:p>
+        </p:txBody>
+      </p:sp>
+      <p:sp>
+        <p:nvSpPr>
+          <p:cNvPr id="7" name="TextBox 6">
+            <a:extLst>
+              <a:ext uri="{FF2B5EF4-FFF2-40B4-BE49-F238E27FC236}">
+                <a16:creationId xmlns:a16="http://schemas.microsoft.com/office/drawing/2014/main" id="{BF16D510-BC74-4FA5-AFD2-193B039115A5}"/>
+              </a:ext>
+            </a:extLst>
+          </p:cNvPr>
+          <p:cNvSpPr txBox="1"/>
+          <p:nvPr/>
+        </p:nvSpPr>
+        <p:spPr>
+          <a:xfrm>
+            <a:off x="7228114" y="362857"/>
+            <a:ext cx="6125029" cy="1015663"/>
+          </a:xfrm>
+          <a:prstGeom prst="rect">
+            <a:avLst/>
+          </a:prstGeom>
+          <a:solidFill>
+            <a:schemeClr val="accent2"/>
+          </a:solidFill>
+        </p:spPr>
+        <p:txBody>
+          <a:bodyPr wrap="square" rtlCol="0">
+            <a:spAutoFit/>
+          </a:bodyPr>
+          <a:lstStyle/>
+          <a:p>
+            <a:r>
+              <a:rPr lang="en-US" b="1" dirty="0"/>
+              <a:t>Opening Question: </a:t>
+            </a:r>
+          </a:p>
+          <a:p>
+            <a:r>
+              <a:rPr lang="en-US" dirty="0"/>
+              <a:t>Try to brain storm *everything* you know about lists, and write it down.</a:t>
+            </a:r>
+          </a:p>
+        </p:txBody>
+      </p:sp>
+    </p:spTree>
+    <p:extLst>
+      <p:ext uri="{BB962C8B-B14F-4D97-AF65-F5344CB8AC3E}">
+        <p14:creationId xmlns:p14="http://schemas.microsoft.com/office/powerpoint/2010/main" val="926474781"/>
+      </p:ext>
+    </p:extLst>
+  </p:cSld>
+  <p:clrMapOvr>
+    <a:masterClrMapping/>
+  </p:clrMapOvr>
+  <p:transition>
+    <p:fade/>
+  </p:transition>
+</p:sld>
+</file>
+
+<file path=ppt/slides/slide3.xml><?xml version="1.0" encoding="utf-8"?>
 <p:sld xmlns:a="http://schemas.openxmlformats.org/drawingml/2006/main" xmlns:r="http://schemas.openxmlformats.org/officeDocument/2006/relationships" xmlns:p="http://schemas.openxmlformats.org/presentationml/2006/main">
   <p:cSld>
     <p:spTree>
@@ -8199,7 +10117,7 @@
 </p:sld>
 </file>
 
-<file path=ppt/slides/slide3.xml><?xml version="1.0" encoding="utf-8"?>
+<file path=ppt/slides/slide4.xml><?xml version="1.0" encoding="utf-8"?>
 <p:sld xmlns:a="http://schemas.openxmlformats.org/drawingml/2006/main" xmlns:r="http://schemas.openxmlformats.org/officeDocument/2006/relationships" xmlns:p="http://schemas.openxmlformats.org/presentationml/2006/main">
   <p:cSld>
     <p:spTree>
@@ -8425,7 +10343,7 @@
 </p:sld>
 </file>
 
-<file path=ppt/slides/slide4.xml><?xml version="1.0" encoding="utf-8"?>
+<file path=ppt/slides/slide5.xml><?xml version="1.0" encoding="utf-8"?>
 <p:sld xmlns:a="http://schemas.openxmlformats.org/drawingml/2006/main" xmlns:r="http://schemas.openxmlformats.org/officeDocument/2006/relationships" xmlns:p="http://schemas.openxmlformats.org/presentationml/2006/main">
   <p:cSld>
     <p:spTree>
@@ -8705,7 +10623,7 @@
 </p:sld>
 </file>
 
-<file path=ppt/slides/slide5.xml><?xml version="1.0" encoding="utf-8"?>
+<file path=ppt/slides/slide6.xml><?xml version="1.0" encoding="utf-8"?>
 <p:sld xmlns:a="http://schemas.openxmlformats.org/drawingml/2006/main" xmlns:r="http://schemas.openxmlformats.org/officeDocument/2006/relationships" xmlns:p="http://schemas.openxmlformats.org/presentationml/2006/main">
   <p:cSld>
     <p:spTree>
@@ -9640,7 +11558,7 @@
 </p:sld>
 </file>
 
-<file path=ppt/slides/slide6.xml><?xml version="1.0" encoding="utf-8"?>
+<file path=ppt/slides/slide7.xml><?xml version="1.0" encoding="utf-8"?>
 <p:sld xmlns:a="http://schemas.openxmlformats.org/drawingml/2006/main" xmlns:r="http://schemas.openxmlformats.org/officeDocument/2006/relationships" xmlns:p="http://schemas.openxmlformats.org/presentationml/2006/main">
   <p:cSld>
     <p:spTree>
@@ -10738,8 +12656,8 @@
         </p:nvSpPr>
         <p:spPr>
           <a:xfrm>
-            <a:off x="4736523" y="5666633"/>
-            <a:ext cx="2962979" cy="523220"/>
+            <a:off x="4536787" y="5666633"/>
+            <a:ext cx="2962979" cy="553998"/>
           </a:xfrm>
           <a:prstGeom prst="rect">
             <a:avLst/>
@@ -10754,7 +12672,15 @@
           <a:p>
             <a:r>
               <a:rPr lang="en-US" sz="1400" dirty="0"/>
-              <a:t>Often sends data in JSON format </a:t>
+              <a:t>Often </a:t>
+            </a:r>
+            <a:r>
+              <a:rPr lang="en-US" sz="1600" dirty="0"/>
+              <a:t>sends</a:t>
+            </a:r>
+            <a:r>
+              <a:rPr lang="en-US" sz="1400" dirty="0"/>
+              <a:t> data in JSON format </a:t>
             </a:r>
             <a:br>
               <a:rPr lang="en-US" sz="1400" dirty="0"/>
@@ -11428,7 +13354,109 @@
 </p:sld>
 </file>
 
-<file path=ppt/slides/slide7.xml><?xml version="1.0" encoding="utf-8"?>
+<file path=ppt/slides/slide8.xml><?xml version="1.0" encoding="utf-8"?>
+<p:sld xmlns:a="http://schemas.openxmlformats.org/drawingml/2006/main" xmlns:r="http://schemas.openxmlformats.org/officeDocument/2006/relationships" xmlns:p="http://schemas.openxmlformats.org/presentationml/2006/main">
+  <p:cSld>
+    <p:spTree>
+      <p:nvGrpSpPr>
+        <p:cNvPr id="1" name=""/>
+        <p:cNvGrpSpPr/>
+        <p:nvPr/>
+      </p:nvGrpSpPr>
+      <p:grpSpPr>
+        <a:xfrm>
+          <a:off x="0" y="0"/>
+          <a:ext cx="0" cy="0"/>
+          <a:chOff x="0" y="0"/>
+          <a:chExt cx="0" cy="0"/>
+        </a:xfrm>
+      </p:grpSpPr>
+      <p:sp>
+        <p:nvSpPr>
+          <p:cNvPr id="4" name="Title 3">
+            <a:extLst>
+              <a:ext uri="{FF2B5EF4-FFF2-40B4-BE49-F238E27FC236}">
+                <a16:creationId xmlns:a16="http://schemas.microsoft.com/office/drawing/2014/main" id="{6ACF7785-1399-461C-BAEE-F061D9540F20}"/>
+              </a:ext>
+            </a:extLst>
+          </p:cNvPr>
+          <p:cNvSpPr>
+            <a:spLocks noGrp="1"/>
+          </p:cNvSpPr>
+          <p:nvPr>
+            <p:ph type="title"/>
+          </p:nvPr>
+        </p:nvSpPr>
+        <p:spPr/>
+        <p:txBody>
+          <a:bodyPr/>
+          <a:lstStyle/>
+          <a:p>
+            <a:r>
+              <a:rPr lang="en-US" dirty="0"/>
+              <a:t>Dictionaries</a:t>
+            </a:r>
+          </a:p>
+        </p:txBody>
+      </p:sp>
+      <p:sp>
+        <p:nvSpPr>
+          <p:cNvPr id="5" name="Text Placeholder 4">
+            <a:extLst>
+              <a:ext uri="{FF2B5EF4-FFF2-40B4-BE49-F238E27FC236}">
+                <a16:creationId xmlns:a16="http://schemas.microsoft.com/office/drawing/2014/main" id="{DB4043C2-C5FC-4A39-B986-FC097E38A078}"/>
+              </a:ext>
+            </a:extLst>
+          </p:cNvPr>
+          <p:cNvSpPr>
+            <a:spLocks noGrp="1"/>
+          </p:cNvSpPr>
+          <p:nvPr>
+            <p:ph type="body" sz="quarter" idx="10"/>
+          </p:nvPr>
+        </p:nvSpPr>
+        <p:spPr/>
+        <p:txBody>
+          <a:bodyPr/>
+          <a:lstStyle/>
+          <a:p>
+            <a:r>
+              <a:rPr lang="en-US" dirty="0" err="1"/>
+              <a:t>key:value</a:t>
+            </a:r>
+            <a:r>
+              <a:rPr lang="en-US" dirty="0"/>
+              <a:t> pairs – in Python</a:t>
+            </a:r>
+          </a:p>
+        </p:txBody>
+      </p:sp>
+    </p:spTree>
+    <p:extLst>
+      <p:ext uri="{BB962C8B-B14F-4D97-AF65-F5344CB8AC3E}">
+        <p14:creationId xmlns:p14="http://schemas.microsoft.com/office/powerpoint/2010/main" val="2959287723"/>
+      </p:ext>
+    </p:extLst>
+  </p:cSld>
+  <p:clrMapOvr>
+    <a:masterClrMapping/>
+  </p:clrMapOvr>
+  <mc:AlternateContent xmlns:mc="http://schemas.openxmlformats.org/markup-compatibility/2006" xmlns:p14="http://schemas.microsoft.com/office/powerpoint/2010/main">
+    <mc:Choice Requires="p14">
+      <p:transition p14:dur="300">
+        <p:fade/>
+      </p:transition>
+    </mc:Choice>
+    <mc:Fallback xmlns="">
+      <p:transition>
+        <p:fade/>
+      </p:transition>
+    </mc:Fallback>
+  </mc:AlternateContent>
+</p:sld>
+</file>
+
+<file path=ppt/slides/slide9.xml><?xml version="1.0" encoding="utf-8"?>
 <p:sld xmlns:a="http://schemas.openxmlformats.org/drawingml/2006/main" xmlns:r="http://schemas.openxmlformats.org/officeDocument/2006/relationships" xmlns:p="http://schemas.openxmlformats.org/presentationml/2006/main">
   <p:cSld>
     <p:spTree>
@@ -11492,7 +13520,7 @@
         <p:spPr>
           <a:xfrm>
             <a:off x="628075" y="1776683"/>
-            <a:ext cx="6280725" cy="2208295"/>
+            <a:ext cx="6280725" cy="3061416"/>
           </a:xfrm>
         </p:spPr>
         <p:txBody>
@@ -11538,6 +13566,14 @@
             <a:r>
               <a:rPr lang="en-US" dirty="0"/>
               <a:t>key – has to be unique!</a:t>
+            </a:r>
+          </a:p>
+          <a:p>
+            <a:r>
+              <a:rPr lang="en-US" dirty="0">
+                <a:latin typeface="Consolas" panose="020B0609020204030204" pitchFamily="49" charset="0"/>
+              </a:rPr>
+              <a:t>grades = {“assignment1”: 2, “assignment2”:2}</a:t>
             </a:r>
           </a:p>
           <a:p>
@@ -11566,7 +13602,7 @@
         </p:nvSpPr>
         <p:spPr>
           <a:xfrm>
-            <a:off x="330458" y="4053817"/>
+            <a:off x="330458" y="4718444"/>
             <a:ext cx="12561453" cy="2554545"/>
           </a:xfrm>
           <a:prstGeom prst="rect">
@@ -12925,1173 +14961,6 @@
       <p:bldP spid="11" grpId="0" animBg="1"/>
     </p:bldLst>
   </p:timing>
-</p:sld>
-</file>
-
-<file path=ppt/slides/slide8.xml><?xml version="1.0" encoding="utf-8"?>
-<p:sld xmlns:a="http://schemas.openxmlformats.org/drawingml/2006/main" xmlns:r="http://schemas.openxmlformats.org/officeDocument/2006/relationships" xmlns:p="http://schemas.openxmlformats.org/presentationml/2006/main">
-  <p:cSld>
-    <p:spTree>
-      <p:nvGrpSpPr>
-        <p:cNvPr id="1" name=""/>
-        <p:cNvGrpSpPr/>
-        <p:nvPr/>
-      </p:nvGrpSpPr>
-      <p:grpSpPr>
-        <a:xfrm>
-          <a:off x="0" y="0"/>
-          <a:ext cx="0" cy="0"/>
-          <a:chOff x="0" y="0"/>
-          <a:chExt cx="0" cy="0"/>
-        </a:xfrm>
-      </p:grpSpPr>
-      <p:sp>
-        <p:nvSpPr>
-          <p:cNvPr id="2" name="Title 1">
-            <a:extLst>
-              <a:ext uri="{FF2B5EF4-FFF2-40B4-BE49-F238E27FC236}">
-                <a16:creationId xmlns:a16="http://schemas.microsoft.com/office/drawing/2014/main" id="{A4704001-F6A6-9640-86A0-97967BEE6FDC}"/>
-              </a:ext>
-            </a:extLst>
-          </p:cNvPr>
-          <p:cNvSpPr>
-            <a:spLocks noGrp="1"/>
-          </p:cNvSpPr>
-          <p:nvPr>
-            <p:ph type="title"/>
-          </p:nvPr>
-        </p:nvSpPr>
-        <p:spPr/>
-        <p:txBody>
-          <a:bodyPr/>
-          <a:lstStyle/>
-          <a:p>
-            <a:r>
-              <a:rPr lang="en-US" dirty="0"/>
-              <a:t>Looping Through Dictionaries</a:t>
-            </a:r>
-          </a:p>
-        </p:txBody>
-      </p:sp>
-      <p:sp>
-        <p:nvSpPr>
-          <p:cNvPr id="3" name="Text Placeholder 2">
-            <a:extLst>
-              <a:ext uri="{FF2B5EF4-FFF2-40B4-BE49-F238E27FC236}">
-                <a16:creationId xmlns:a16="http://schemas.microsoft.com/office/drawing/2014/main" id="{78BF5854-456E-2E42-9956-B6A13495CB48}"/>
-              </a:ext>
-            </a:extLst>
-          </p:cNvPr>
-          <p:cNvSpPr>
-            <a:spLocks noGrp="1"/>
-          </p:cNvSpPr>
-          <p:nvPr>
-            <p:ph type="body" sz="quarter" idx="10"/>
-          </p:nvPr>
-        </p:nvSpPr>
-        <p:spPr>
-          <a:xfrm>
-            <a:off x="628075" y="1776683"/>
-            <a:ext cx="12561453" cy="2312684"/>
-          </a:xfrm>
-        </p:spPr>
-        <p:txBody>
-          <a:bodyPr/>
-          <a:lstStyle/>
-          <a:p>
-            <a:r>
-              <a:rPr lang="en-US" dirty="0" err="1"/>
-              <a:t>dict.keys</a:t>
-            </a:r>
-            <a:r>
-              <a:rPr lang="en-US" dirty="0"/>
-              <a:t>() -  give list of keys</a:t>
-            </a:r>
-          </a:p>
-          <a:p>
-            <a:pPr lvl="1"/>
-            <a:r>
-              <a:rPr lang="en-US" dirty="0"/>
-              <a:t>in no particular order! </a:t>
-            </a:r>
-          </a:p>
-          <a:p>
-            <a:r>
-              <a:rPr lang="en-US" dirty="0" err="1"/>
-              <a:t>dict.values</a:t>
-            </a:r>
-            <a:r>
-              <a:rPr lang="en-US" dirty="0"/>
-              <a:t>() -  give items  *without  keys*</a:t>
-            </a:r>
-          </a:p>
-          <a:p>
-            <a:r>
-              <a:rPr lang="en-US" dirty="0" err="1"/>
-              <a:t>dict.items</a:t>
-            </a:r>
-            <a:r>
-              <a:rPr lang="en-US" dirty="0"/>
-              <a:t>()  - gives tuple of (key,  value)</a:t>
-            </a:r>
-          </a:p>
-          <a:p>
-            <a:endParaRPr lang="en-US" dirty="0"/>
-          </a:p>
-        </p:txBody>
-      </p:sp>
-      <p:sp>
-        <p:nvSpPr>
-          <p:cNvPr id="5" name="TextBox 4">
-            <a:extLst>
-              <a:ext uri="{FF2B5EF4-FFF2-40B4-BE49-F238E27FC236}">
-                <a16:creationId xmlns:a16="http://schemas.microsoft.com/office/drawing/2014/main" id="{74CAC2A5-95C0-E14B-BDAA-750D0B2F9F4A}"/>
-              </a:ext>
-            </a:extLst>
-          </p:cNvPr>
-          <p:cNvSpPr txBox="1"/>
-          <p:nvPr/>
-        </p:nvSpPr>
-        <p:spPr>
-          <a:xfrm>
-            <a:off x="628072" y="3694442"/>
-            <a:ext cx="8261928" cy="707886"/>
-          </a:xfrm>
-          <a:prstGeom prst="rect">
-            <a:avLst/>
-          </a:prstGeom>
-          <a:noFill/>
-        </p:spPr>
-        <p:txBody>
-          <a:bodyPr wrap="square">
-            <a:spAutoFit/>
-          </a:bodyPr>
-          <a:lstStyle/>
-          <a:p>
-            <a:r>
-              <a:rPr lang="en-US" dirty="0">
-                <a:solidFill>
-                  <a:srgbClr val="CC7832"/>
-                </a:solidFill>
-                <a:effectLst/>
-                <a:latin typeface="Consolas" panose="020B0609020204030204" pitchFamily="49" charset="0"/>
-                <a:cs typeface="Consolas" panose="020B0609020204030204" pitchFamily="49" charset="0"/>
-              </a:rPr>
-              <a:t>for </a:t>
-            </a:r>
-            <a:r>
-              <a:rPr lang="en-US" dirty="0">
-                <a:latin typeface="Consolas" panose="020B0609020204030204" pitchFamily="49" charset="0"/>
-                <a:cs typeface="Consolas" panose="020B0609020204030204" pitchFamily="49" charset="0"/>
-              </a:rPr>
-              <a:t>key</a:t>
-            </a:r>
-            <a:r>
-              <a:rPr lang="en-US" dirty="0">
-                <a:solidFill>
-                  <a:srgbClr val="CC7832"/>
-                </a:solidFill>
-                <a:effectLst/>
-                <a:latin typeface="Consolas" panose="020B0609020204030204" pitchFamily="49" charset="0"/>
-                <a:cs typeface="Consolas" panose="020B0609020204030204" pitchFamily="49" charset="0"/>
-              </a:rPr>
-              <a:t>, </a:t>
-            </a:r>
-            <a:r>
-              <a:rPr lang="en-US" dirty="0">
-                <a:latin typeface="Consolas" panose="020B0609020204030204" pitchFamily="49" charset="0"/>
-                <a:cs typeface="Consolas" panose="020B0609020204030204" pitchFamily="49" charset="0"/>
-              </a:rPr>
-              <a:t>value </a:t>
-            </a:r>
-            <a:r>
-              <a:rPr lang="en-US" dirty="0">
-                <a:solidFill>
-                  <a:srgbClr val="CC7832"/>
-                </a:solidFill>
-                <a:effectLst/>
-                <a:latin typeface="Consolas" panose="020B0609020204030204" pitchFamily="49" charset="0"/>
-                <a:cs typeface="Consolas" panose="020B0609020204030204" pitchFamily="49" charset="0"/>
-              </a:rPr>
-              <a:t>in </a:t>
-            </a:r>
-            <a:r>
-              <a:rPr lang="en-US" dirty="0" err="1">
-                <a:latin typeface="Consolas" panose="020B0609020204030204" pitchFamily="49" charset="0"/>
-                <a:cs typeface="Consolas" panose="020B0609020204030204" pitchFamily="49" charset="0"/>
-              </a:rPr>
-              <a:t>authorized.items</a:t>
-            </a:r>
-            <a:r>
-              <a:rPr lang="en-US" dirty="0">
-                <a:latin typeface="Consolas" panose="020B0609020204030204" pitchFamily="49" charset="0"/>
-                <a:cs typeface="Consolas" panose="020B0609020204030204" pitchFamily="49" charset="0"/>
-              </a:rPr>
-              <a:t>():</a:t>
-            </a:r>
-            <a:br>
-              <a:rPr lang="en-US" dirty="0">
-                <a:latin typeface="Consolas" panose="020B0609020204030204" pitchFamily="49" charset="0"/>
-                <a:cs typeface="Consolas" panose="020B0609020204030204" pitchFamily="49" charset="0"/>
-              </a:rPr>
-            </a:br>
-            <a:r>
-              <a:rPr lang="en-US" dirty="0">
-                <a:latin typeface="Consolas" panose="020B0609020204030204" pitchFamily="49" charset="0"/>
-                <a:cs typeface="Consolas" panose="020B0609020204030204" pitchFamily="49" charset="0"/>
-              </a:rPr>
-              <a:t>    </a:t>
-            </a:r>
-            <a:r>
-              <a:rPr lang="en-US" dirty="0">
-                <a:solidFill>
-                  <a:srgbClr val="8888C6"/>
-                </a:solidFill>
-                <a:effectLst/>
-                <a:latin typeface="Consolas" panose="020B0609020204030204" pitchFamily="49" charset="0"/>
-                <a:cs typeface="Consolas" panose="020B0609020204030204" pitchFamily="49" charset="0"/>
-              </a:rPr>
-              <a:t>print</a:t>
-            </a:r>
-            <a:r>
-              <a:rPr lang="en-US" dirty="0">
-                <a:latin typeface="Consolas" panose="020B0609020204030204" pitchFamily="49" charset="0"/>
-                <a:cs typeface="Consolas" panose="020B0609020204030204" pitchFamily="49" charset="0"/>
-              </a:rPr>
-              <a:t>(</a:t>
-            </a:r>
-            <a:r>
-              <a:rPr lang="en-US" dirty="0">
-                <a:solidFill>
-                  <a:srgbClr val="6A8759"/>
-                </a:solidFill>
-                <a:effectLst/>
-                <a:latin typeface="Consolas" panose="020B0609020204030204" pitchFamily="49" charset="0"/>
-                <a:cs typeface="Consolas" panose="020B0609020204030204" pitchFamily="49" charset="0"/>
-              </a:rPr>
-              <a:t>"{} is authorized in {}"</a:t>
-            </a:r>
-            <a:r>
-              <a:rPr lang="en-US" dirty="0">
-                <a:latin typeface="Consolas" panose="020B0609020204030204" pitchFamily="49" charset="0"/>
-                <a:cs typeface="Consolas" panose="020B0609020204030204" pitchFamily="49" charset="0"/>
-              </a:rPr>
-              <a:t>.format(key</a:t>
-            </a:r>
-            <a:r>
-              <a:rPr lang="en-US" dirty="0">
-                <a:solidFill>
-                  <a:srgbClr val="CC7832"/>
-                </a:solidFill>
-                <a:effectLst/>
-                <a:latin typeface="Consolas" panose="020B0609020204030204" pitchFamily="49" charset="0"/>
-                <a:cs typeface="Consolas" panose="020B0609020204030204" pitchFamily="49" charset="0"/>
-              </a:rPr>
-              <a:t>, </a:t>
-            </a:r>
-            <a:r>
-              <a:rPr lang="en-US" dirty="0">
-                <a:latin typeface="Consolas" panose="020B0609020204030204" pitchFamily="49" charset="0"/>
-                <a:cs typeface="Consolas" panose="020B0609020204030204" pitchFamily="49" charset="0"/>
-              </a:rPr>
-              <a:t>value))</a:t>
-            </a:r>
-          </a:p>
-        </p:txBody>
-      </p:sp>
-      <p:sp>
-        <p:nvSpPr>
-          <p:cNvPr id="7" name="TextBox 6">
-            <a:extLst>
-              <a:ext uri="{FF2B5EF4-FFF2-40B4-BE49-F238E27FC236}">
-                <a16:creationId xmlns:a16="http://schemas.microsoft.com/office/drawing/2014/main" id="{67D9FD07-F080-774F-8A0D-3E48A30DD4E0}"/>
-              </a:ext>
-            </a:extLst>
-          </p:cNvPr>
-          <p:cNvSpPr txBox="1"/>
-          <p:nvPr/>
-        </p:nvSpPr>
-        <p:spPr>
-          <a:xfrm>
-            <a:off x="628072" y="4696999"/>
-            <a:ext cx="12166600" cy="1631216"/>
-          </a:xfrm>
-          <a:prstGeom prst="rect">
-            <a:avLst/>
-          </a:prstGeom>
-          <a:noFill/>
-        </p:spPr>
-        <p:txBody>
-          <a:bodyPr wrap="square">
-            <a:spAutoFit/>
-          </a:bodyPr>
-          <a:lstStyle/>
-          <a:p>
-            <a:r>
-              <a:rPr lang="en-US" dirty="0"/>
-              <a:t>Murdoch is authorized in ['Cut &amp; Thrust', 'Rapier Spear', 'Rapier', 'Combat Archery', 'Armored Combat']</a:t>
-            </a:r>
-          </a:p>
-          <a:p>
-            <a:r>
-              <a:rPr lang="en-US" dirty="0" err="1"/>
-              <a:t>Valtaja</a:t>
-            </a:r>
-            <a:r>
-              <a:rPr lang="en-US" dirty="0"/>
-              <a:t> is authorized in ['Cut &amp; Thrust', 'Rapier Spear', 'Rapier']</a:t>
-            </a:r>
-          </a:p>
-          <a:p>
-            <a:r>
-              <a:rPr lang="en-US" dirty="0" err="1"/>
-              <a:t>Aegeon</a:t>
-            </a:r>
-            <a:r>
-              <a:rPr lang="en-US" dirty="0"/>
-              <a:t> is authorized in ['Cut &amp; Thrust', 'Rapier Spear', 'Rapier', 'Armored Combat', 'Great Weapons']</a:t>
-            </a:r>
-          </a:p>
-          <a:p>
-            <a:r>
-              <a:rPr lang="en-US" dirty="0"/>
-              <a:t>Miriam is authorized in ['Cut &amp; Thrust', 'Great Weapons’]</a:t>
-            </a:r>
-          </a:p>
-          <a:p>
-            <a:r>
-              <a:rPr lang="en-US" dirty="0"/>
-              <a:t>Felix is authorized in ['Armored Combat', 'Great Weapons']</a:t>
-            </a:r>
-          </a:p>
-        </p:txBody>
-      </p:sp>
-      <p:sp>
-        <p:nvSpPr>
-          <p:cNvPr id="8" name="TextBox 7">
-            <a:extLst>
-              <a:ext uri="{FF2B5EF4-FFF2-40B4-BE49-F238E27FC236}">
-                <a16:creationId xmlns:a16="http://schemas.microsoft.com/office/drawing/2014/main" id="{D7E31B8F-6D87-CB4A-AF17-7A85BCB206FE}"/>
-              </a:ext>
-            </a:extLst>
-          </p:cNvPr>
-          <p:cNvSpPr txBox="1"/>
-          <p:nvPr/>
-        </p:nvSpPr>
-        <p:spPr>
-          <a:xfrm>
-            <a:off x="4069721" y="6511984"/>
-            <a:ext cx="5396029" cy="400110"/>
-          </a:xfrm>
-          <a:prstGeom prst="rect">
-            <a:avLst/>
-          </a:prstGeom>
-          <a:noFill/>
-        </p:spPr>
-        <p:txBody>
-          <a:bodyPr wrap="none" rtlCol="0">
-            <a:spAutoFit/>
-          </a:bodyPr>
-          <a:lstStyle/>
-          <a:p>
-            <a:r>
-              <a:rPr lang="en-US" dirty="0"/>
-              <a:t>What if I wanted to print in alphabetical order?</a:t>
-            </a:r>
-          </a:p>
-        </p:txBody>
-      </p:sp>
-    </p:spTree>
-    <p:extLst>
-      <p:ext uri="{BB962C8B-B14F-4D97-AF65-F5344CB8AC3E}">
-        <p14:creationId xmlns:p14="http://schemas.microsoft.com/office/powerpoint/2010/main" val="3882659456"/>
-      </p:ext>
-    </p:extLst>
-  </p:cSld>
-  <p:clrMapOvr>
-    <a:masterClrMapping/>
-  </p:clrMapOvr>
-  <mc:AlternateContent xmlns:mc="http://schemas.openxmlformats.org/markup-compatibility/2006" xmlns:p14="http://schemas.microsoft.com/office/powerpoint/2010/main">
-    <mc:Choice Requires="p14">
-      <p:transition p14:dur="300">
-        <p:fade/>
-      </p:transition>
-    </mc:Choice>
-    <mc:Fallback xmlns="">
-      <p:transition>
-        <p:fade/>
-      </p:transition>
-    </mc:Fallback>
-  </mc:AlternateContent>
-</p:sld>
-</file>
-
-<file path=ppt/slides/slide9.xml><?xml version="1.0" encoding="utf-8"?>
-<p:sld xmlns:a="http://schemas.openxmlformats.org/drawingml/2006/main" xmlns:r="http://schemas.openxmlformats.org/officeDocument/2006/relationships" xmlns:p="http://schemas.openxmlformats.org/presentationml/2006/main" show="0">
-  <p:cSld>
-    <p:spTree>
-      <p:nvGrpSpPr>
-        <p:cNvPr id="1" name=""/>
-        <p:cNvGrpSpPr/>
-        <p:nvPr/>
-      </p:nvGrpSpPr>
-      <p:grpSpPr>
-        <a:xfrm>
-          <a:off x="0" y="0"/>
-          <a:ext cx="0" cy="0"/>
-          <a:chOff x="0" y="0"/>
-          <a:chExt cx="0" cy="0"/>
-        </a:xfrm>
-      </p:grpSpPr>
-      <p:sp>
-        <p:nvSpPr>
-          <p:cNvPr id="2" name="Title 1">
-            <a:extLst>
-              <a:ext uri="{FF2B5EF4-FFF2-40B4-BE49-F238E27FC236}">
-                <a16:creationId xmlns:a16="http://schemas.microsoft.com/office/drawing/2014/main" id="{E5B9461C-1D72-7846-87B2-3D1C51EFD406}"/>
-              </a:ext>
-            </a:extLst>
-          </p:cNvPr>
-          <p:cNvSpPr>
-            <a:spLocks noGrp="1"/>
-          </p:cNvSpPr>
-          <p:nvPr>
-            <p:ph type="title"/>
-          </p:nvPr>
-        </p:nvSpPr>
-        <p:spPr/>
-        <p:txBody>
-          <a:bodyPr/>
-          <a:lstStyle/>
-          <a:p>
-            <a:r>
-              <a:rPr lang="en-US" dirty="0"/>
-              <a:t>Let’s Code</a:t>
-            </a:r>
-          </a:p>
-        </p:txBody>
-      </p:sp>
-      <p:sp>
-        <p:nvSpPr>
-          <p:cNvPr id="5" name="TextBox 4">
-            <a:extLst>
-              <a:ext uri="{FF2B5EF4-FFF2-40B4-BE49-F238E27FC236}">
-                <a16:creationId xmlns:a16="http://schemas.microsoft.com/office/drawing/2014/main" id="{F8147D93-06A3-2F44-A3FB-C8AD6003CE28}"/>
-              </a:ext>
-            </a:extLst>
-          </p:cNvPr>
-          <p:cNvSpPr txBox="1"/>
-          <p:nvPr/>
-        </p:nvSpPr>
-        <p:spPr>
-          <a:xfrm>
-            <a:off x="3454400" y="1839486"/>
-            <a:ext cx="6908800" cy="4708981"/>
-          </a:xfrm>
-          <a:prstGeom prst="rect">
-            <a:avLst/>
-          </a:prstGeom>
-          <a:noFill/>
-        </p:spPr>
-        <p:txBody>
-          <a:bodyPr wrap="square">
-            <a:spAutoFit/>
-          </a:bodyPr>
-          <a:lstStyle/>
-          <a:p>
-            <a:r>
-              <a:rPr lang="en-US" dirty="0">
-                <a:solidFill>
-                  <a:srgbClr val="CC7832"/>
-                </a:solidFill>
-                <a:effectLst/>
-                <a:latin typeface="Consolas" panose="020B0609020204030204" pitchFamily="49" charset="0"/>
-                <a:cs typeface="Consolas" panose="020B0609020204030204" pitchFamily="49" charset="0"/>
-              </a:rPr>
-              <a:t>def </a:t>
-            </a:r>
-            <a:r>
-              <a:rPr lang="en-US" dirty="0" err="1">
-                <a:solidFill>
-                  <a:srgbClr val="FFC66D"/>
-                </a:solidFill>
-                <a:effectLst/>
-                <a:latin typeface="Consolas" panose="020B0609020204030204" pitchFamily="49" charset="0"/>
-                <a:cs typeface="Consolas" panose="020B0609020204030204" pitchFamily="49" charset="0"/>
-              </a:rPr>
-              <a:t>is_auth</a:t>
-            </a:r>
-            <a:r>
-              <a:rPr lang="en-US" dirty="0">
-                <a:latin typeface="Consolas" panose="020B0609020204030204" pitchFamily="49" charset="0"/>
-                <a:cs typeface="Consolas" panose="020B0609020204030204" pitchFamily="49" charset="0"/>
-              </a:rPr>
-              <a:t>(name</a:t>
-            </a:r>
-            <a:r>
-              <a:rPr lang="en-US" dirty="0">
-                <a:solidFill>
-                  <a:srgbClr val="CC7832"/>
-                </a:solidFill>
-                <a:effectLst/>
-                <a:latin typeface="Consolas" panose="020B0609020204030204" pitchFamily="49" charset="0"/>
-                <a:cs typeface="Consolas" panose="020B0609020204030204" pitchFamily="49" charset="0"/>
-              </a:rPr>
-              <a:t>, </a:t>
-            </a:r>
-            <a:r>
-              <a:rPr lang="en-US" dirty="0">
-                <a:latin typeface="Consolas" panose="020B0609020204030204" pitchFamily="49" charset="0"/>
-                <a:cs typeface="Consolas" panose="020B0609020204030204" pitchFamily="49" charset="0"/>
-              </a:rPr>
-              <a:t>auth</a:t>
-            </a:r>
-            <a:r>
-              <a:rPr lang="en-US" dirty="0">
-                <a:solidFill>
-                  <a:srgbClr val="CC7832"/>
-                </a:solidFill>
-                <a:effectLst/>
-                <a:latin typeface="Consolas" panose="020B0609020204030204" pitchFamily="49" charset="0"/>
-                <a:cs typeface="Consolas" panose="020B0609020204030204" pitchFamily="49" charset="0"/>
-              </a:rPr>
-              <a:t>, </a:t>
-            </a:r>
-            <a:r>
-              <a:rPr lang="en-US" dirty="0" err="1">
-                <a:latin typeface="Consolas" panose="020B0609020204030204" pitchFamily="49" charset="0"/>
-                <a:cs typeface="Consolas" panose="020B0609020204030204" pitchFamily="49" charset="0"/>
-              </a:rPr>
-              <a:t>auth_dict</a:t>
-            </a:r>
-            <a:r>
-              <a:rPr lang="en-US" dirty="0">
-                <a:latin typeface="Consolas" panose="020B0609020204030204" pitchFamily="49" charset="0"/>
-                <a:cs typeface="Consolas" panose="020B0609020204030204" pitchFamily="49" charset="0"/>
-              </a:rPr>
-              <a:t>):</a:t>
-            </a:r>
-            <a:br>
-              <a:rPr lang="en-US" dirty="0">
-                <a:latin typeface="Consolas" panose="020B0609020204030204" pitchFamily="49" charset="0"/>
-                <a:cs typeface="Consolas" panose="020B0609020204030204" pitchFamily="49" charset="0"/>
-              </a:rPr>
-            </a:br>
-            <a:r>
-              <a:rPr lang="en-US" dirty="0">
-                <a:latin typeface="Consolas" panose="020B0609020204030204" pitchFamily="49" charset="0"/>
-                <a:cs typeface="Consolas" panose="020B0609020204030204" pitchFamily="49" charset="0"/>
-              </a:rPr>
-              <a:t>    </a:t>
-            </a:r>
-            <a:r>
-              <a:rPr lang="en-US" dirty="0">
-                <a:solidFill>
-                  <a:srgbClr val="CC7832"/>
-                </a:solidFill>
-                <a:effectLst/>
-                <a:latin typeface="Consolas" panose="020B0609020204030204" pitchFamily="49" charset="0"/>
-                <a:cs typeface="Consolas" panose="020B0609020204030204" pitchFamily="49" charset="0"/>
-              </a:rPr>
-              <a:t>return </a:t>
-            </a:r>
-            <a:r>
-              <a:rPr lang="en-US" dirty="0">
-                <a:latin typeface="Consolas" panose="020B0609020204030204" pitchFamily="49" charset="0"/>
-                <a:cs typeface="Consolas" panose="020B0609020204030204" pitchFamily="49" charset="0"/>
-              </a:rPr>
-              <a:t>auth </a:t>
-            </a:r>
-            <a:r>
-              <a:rPr lang="en-US" dirty="0">
-                <a:solidFill>
-                  <a:srgbClr val="CC7832"/>
-                </a:solidFill>
-                <a:effectLst/>
-                <a:latin typeface="Consolas" panose="020B0609020204030204" pitchFamily="49" charset="0"/>
-                <a:cs typeface="Consolas" panose="020B0609020204030204" pitchFamily="49" charset="0"/>
-              </a:rPr>
-              <a:t>in </a:t>
-            </a:r>
-            <a:r>
-              <a:rPr lang="en-US" dirty="0" err="1">
-                <a:latin typeface="Consolas" panose="020B0609020204030204" pitchFamily="49" charset="0"/>
-                <a:cs typeface="Consolas" panose="020B0609020204030204" pitchFamily="49" charset="0"/>
-              </a:rPr>
-              <a:t>auth_dict</a:t>
-            </a:r>
-            <a:r>
-              <a:rPr lang="en-US" dirty="0">
-                <a:latin typeface="Consolas" panose="020B0609020204030204" pitchFamily="49" charset="0"/>
-                <a:cs typeface="Consolas" panose="020B0609020204030204" pitchFamily="49" charset="0"/>
-              </a:rPr>
-              <a:t>[name]</a:t>
-            </a:r>
-            <a:br>
-              <a:rPr lang="en-US" dirty="0">
-                <a:latin typeface="Consolas" panose="020B0609020204030204" pitchFamily="49" charset="0"/>
-                <a:cs typeface="Consolas" panose="020B0609020204030204" pitchFamily="49" charset="0"/>
-              </a:rPr>
-            </a:br>
-            <a:br>
-              <a:rPr lang="en-US" dirty="0">
-                <a:latin typeface="Consolas" panose="020B0609020204030204" pitchFamily="49" charset="0"/>
-                <a:cs typeface="Consolas" panose="020B0609020204030204" pitchFamily="49" charset="0"/>
-              </a:rPr>
-            </a:br>
-            <a:r>
-              <a:rPr lang="en-US" dirty="0">
-                <a:solidFill>
-                  <a:srgbClr val="CC7832"/>
-                </a:solidFill>
-                <a:effectLst/>
-                <a:latin typeface="Consolas" panose="020B0609020204030204" pitchFamily="49" charset="0"/>
-                <a:cs typeface="Consolas" panose="020B0609020204030204" pitchFamily="49" charset="0"/>
-              </a:rPr>
-              <a:t>def </a:t>
-            </a:r>
-            <a:r>
-              <a:rPr lang="en-US" dirty="0" err="1">
-                <a:solidFill>
-                  <a:srgbClr val="FFC66D"/>
-                </a:solidFill>
-                <a:effectLst/>
-                <a:latin typeface="Consolas" panose="020B0609020204030204" pitchFamily="49" charset="0"/>
-                <a:cs typeface="Consolas" panose="020B0609020204030204" pitchFamily="49" charset="0"/>
-              </a:rPr>
-              <a:t>add_auth</a:t>
-            </a:r>
-            <a:r>
-              <a:rPr lang="en-US" dirty="0">
-                <a:latin typeface="Consolas" panose="020B0609020204030204" pitchFamily="49" charset="0"/>
-                <a:cs typeface="Consolas" panose="020B0609020204030204" pitchFamily="49" charset="0"/>
-              </a:rPr>
-              <a:t>(name</a:t>
-            </a:r>
-            <a:r>
-              <a:rPr lang="en-US" dirty="0">
-                <a:solidFill>
-                  <a:srgbClr val="CC7832"/>
-                </a:solidFill>
-                <a:effectLst/>
-                <a:latin typeface="Consolas" panose="020B0609020204030204" pitchFamily="49" charset="0"/>
-                <a:cs typeface="Consolas" panose="020B0609020204030204" pitchFamily="49" charset="0"/>
-              </a:rPr>
-              <a:t>,  </a:t>
-            </a:r>
-            <a:r>
-              <a:rPr lang="en-US" dirty="0">
-                <a:latin typeface="Consolas" panose="020B0609020204030204" pitchFamily="49" charset="0"/>
-                <a:cs typeface="Consolas" panose="020B0609020204030204" pitchFamily="49" charset="0"/>
-              </a:rPr>
-              <a:t>auth</a:t>
-            </a:r>
-            <a:r>
-              <a:rPr lang="en-US" dirty="0">
-                <a:solidFill>
-                  <a:srgbClr val="CC7832"/>
-                </a:solidFill>
-                <a:effectLst/>
-                <a:latin typeface="Consolas" panose="020B0609020204030204" pitchFamily="49" charset="0"/>
-                <a:cs typeface="Consolas" panose="020B0609020204030204" pitchFamily="49" charset="0"/>
-              </a:rPr>
-              <a:t>, </a:t>
-            </a:r>
-            <a:r>
-              <a:rPr lang="en-US" dirty="0" err="1">
-                <a:latin typeface="Consolas" panose="020B0609020204030204" pitchFamily="49" charset="0"/>
-                <a:cs typeface="Consolas" panose="020B0609020204030204" pitchFamily="49" charset="0"/>
-              </a:rPr>
-              <a:t>auth_dict</a:t>
-            </a:r>
-            <a:r>
-              <a:rPr lang="en-US" dirty="0">
-                <a:latin typeface="Consolas" panose="020B0609020204030204" pitchFamily="49" charset="0"/>
-                <a:cs typeface="Consolas" panose="020B0609020204030204" pitchFamily="49" charset="0"/>
-              </a:rPr>
-              <a:t>):</a:t>
-            </a:r>
-            <a:br>
-              <a:rPr lang="en-US" dirty="0">
-                <a:latin typeface="Consolas" panose="020B0609020204030204" pitchFamily="49" charset="0"/>
-                <a:cs typeface="Consolas" panose="020B0609020204030204" pitchFamily="49" charset="0"/>
-              </a:rPr>
-            </a:br>
-            <a:r>
-              <a:rPr lang="en-US" dirty="0">
-                <a:latin typeface="Consolas" panose="020B0609020204030204" pitchFamily="49" charset="0"/>
-                <a:cs typeface="Consolas" panose="020B0609020204030204" pitchFamily="49" charset="0"/>
-              </a:rPr>
-              <a:t>    </a:t>
-            </a:r>
-            <a:r>
-              <a:rPr lang="en-US" dirty="0">
-                <a:solidFill>
-                  <a:srgbClr val="CC7832"/>
-                </a:solidFill>
-                <a:effectLst/>
-                <a:latin typeface="Consolas" panose="020B0609020204030204" pitchFamily="49" charset="0"/>
-                <a:cs typeface="Consolas" panose="020B0609020204030204" pitchFamily="49" charset="0"/>
-              </a:rPr>
-              <a:t>if not </a:t>
-            </a:r>
-            <a:r>
-              <a:rPr lang="en-US" dirty="0" err="1">
-                <a:latin typeface="Consolas" panose="020B0609020204030204" pitchFamily="49" charset="0"/>
-                <a:cs typeface="Consolas" panose="020B0609020204030204" pitchFamily="49" charset="0"/>
-              </a:rPr>
-              <a:t>is_auth</a:t>
-            </a:r>
-            <a:r>
-              <a:rPr lang="en-US" dirty="0">
-                <a:latin typeface="Consolas" panose="020B0609020204030204" pitchFamily="49" charset="0"/>
-                <a:cs typeface="Consolas" panose="020B0609020204030204" pitchFamily="49" charset="0"/>
-              </a:rPr>
-              <a:t>(name</a:t>
-            </a:r>
-            <a:r>
-              <a:rPr lang="en-US" dirty="0">
-                <a:solidFill>
-                  <a:srgbClr val="CC7832"/>
-                </a:solidFill>
-                <a:effectLst/>
-                <a:latin typeface="Consolas" panose="020B0609020204030204" pitchFamily="49" charset="0"/>
-                <a:cs typeface="Consolas" panose="020B0609020204030204" pitchFamily="49" charset="0"/>
-              </a:rPr>
-              <a:t>, </a:t>
-            </a:r>
-            <a:r>
-              <a:rPr lang="en-US" dirty="0">
-                <a:latin typeface="Consolas" panose="020B0609020204030204" pitchFamily="49" charset="0"/>
-                <a:cs typeface="Consolas" panose="020B0609020204030204" pitchFamily="49" charset="0"/>
-              </a:rPr>
-              <a:t>auth</a:t>
-            </a:r>
-            <a:r>
-              <a:rPr lang="en-US" dirty="0">
-                <a:solidFill>
-                  <a:srgbClr val="CC7832"/>
-                </a:solidFill>
-                <a:effectLst/>
-                <a:latin typeface="Consolas" panose="020B0609020204030204" pitchFamily="49" charset="0"/>
-                <a:cs typeface="Consolas" panose="020B0609020204030204" pitchFamily="49" charset="0"/>
-              </a:rPr>
-              <a:t>, </a:t>
-            </a:r>
-            <a:r>
-              <a:rPr lang="en-US" dirty="0" err="1">
-                <a:latin typeface="Consolas" panose="020B0609020204030204" pitchFamily="49" charset="0"/>
-                <a:cs typeface="Consolas" panose="020B0609020204030204" pitchFamily="49" charset="0"/>
-              </a:rPr>
-              <a:t>auth_dict</a:t>
-            </a:r>
-            <a:r>
-              <a:rPr lang="en-US" dirty="0">
-                <a:latin typeface="Consolas" panose="020B0609020204030204" pitchFamily="49" charset="0"/>
-                <a:cs typeface="Consolas" panose="020B0609020204030204" pitchFamily="49" charset="0"/>
-              </a:rPr>
-              <a:t>):</a:t>
-            </a:r>
-            <a:br>
-              <a:rPr lang="en-US" dirty="0">
-                <a:latin typeface="Consolas" panose="020B0609020204030204" pitchFamily="49" charset="0"/>
-                <a:cs typeface="Consolas" panose="020B0609020204030204" pitchFamily="49" charset="0"/>
-              </a:rPr>
-            </a:br>
-            <a:r>
-              <a:rPr lang="en-US" dirty="0">
-                <a:latin typeface="Consolas" panose="020B0609020204030204" pitchFamily="49" charset="0"/>
-                <a:cs typeface="Consolas" panose="020B0609020204030204" pitchFamily="49" charset="0"/>
-              </a:rPr>
-              <a:t>        </a:t>
-            </a:r>
-            <a:r>
-              <a:rPr lang="en-US" dirty="0" err="1">
-                <a:latin typeface="Consolas" panose="020B0609020204030204" pitchFamily="49" charset="0"/>
-                <a:cs typeface="Consolas" panose="020B0609020204030204" pitchFamily="49" charset="0"/>
-              </a:rPr>
-              <a:t>auth_dict</a:t>
-            </a:r>
-            <a:r>
-              <a:rPr lang="en-US" dirty="0">
-                <a:latin typeface="Consolas" panose="020B0609020204030204" pitchFamily="49" charset="0"/>
-                <a:cs typeface="Consolas" panose="020B0609020204030204" pitchFamily="49" charset="0"/>
-              </a:rPr>
-              <a:t>[name].append(auth)</a:t>
-            </a:r>
-          </a:p>
-          <a:p>
-            <a:r>
-              <a:rPr lang="en-US" dirty="0">
-                <a:solidFill>
-                  <a:srgbClr val="CC7832"/>
-                </a:solidFill>
-                <a:latin typeface="Consolas" panose="020B0609020204030204" pitchFamily="49" charset="0"/>
-                <a:cs typeface="Consolas" panose="020B0609020204030204" pitchFamily="49" charset="0"/>
-              </a:rPr>
-              <a:t>	else</a:t>
-            </a:r>
-            <a:r>
-              <a:rPr lang="en-US" dirty="0">
-                <a:latin typeface="Consolas" panose="020B0609020204030204" pitchFamily="49" charset="0"/>
-                <a:cs typeface="Consolas" panose="020B0609020204030204" pitchFamily="49" charset="0"/>
-              </a:rPr>
-              <a:t>:</a:t>
-            </a:r>
-            <a:br>
-              <a:rPr lang="en-US" dirty="0">
-                <a:latin typeface="Consolas" panose="020B0609020204030204" pitchFamily="49" charset="0"/>
-                <a:cs typeface="Consolas" panose="020B0609020204030204" pitchFamily="49" charset="0"/>
-              </a:rPr>
-            </a:br>
-            <a:r>
-              <a:rPr lang="en-US" dirty="0">
-                <a:latin typeface="Consolas" panose="020B0609020204030204" pitchFamily="49" charset="0"/>
-                <a:cs typeface="Consolas" panose="020B0609020204030204" pitchFamily="49" charset="0"/>
-              </a:rPr>
-              <a:t>    	 </a:t>
-            </a:r>
-            <a:r>
-              <a:rPr lang="en-US" dirty="0" err="1">
-                <a:latin typeface="Consolas" panose="020B0609020204030204" pitchFamily="49" charset="0"/>
-                <a:cs typeface="Consolas" panose="020B0609020204030204" pitchFamily="49" charset="0"/>
-              </a:rPr>
-              <a:t>auth_dict</a:t>
-            </a:r>
-            <a:r>
-              <a:rPr lang="en-US" dirty="0">
-                <a:latin typeface="Consolas" panose="020B0609020204030204" pitchFamily="49" charset="0"/>
-                <a:cs typeface="Consolas" panose="020B0609020204030204" pitchFamily="49" charset="0"/>
-              </a:rPr>
-              <a:t>[name] = [auth]</a:t>
-            </a:r>
-            <a:br>
-              <a:rPr lang="en-US" dirty="0">
-                <a:latin typeface="Consolas" panose="020B0609020204030204" pitchFamily="49" charset="0"/>
-                <a:cs typeface="Consolas" panose="020B0609020204030204" pitchFamily="49" charset="0"/>
-              </a:rPr>
-            </a:br>
-            <a:br>
-              <a:rPr lang="en-US" dirty="0">
-                <a:latin typeface="Consolas" panose="020B0609020204030204" pitchFamily="49" charset="0"/>
-                <a:cs typeface="Consolas" panose="020B0609020204030204" pitchFamily="49" charset="0"/>
-              </a:rPr>
-            </a:br>
-            <a:r>
-              <a:rPr lang="en-US" dirty="0">
-                <a:solidFill>
-                  <a:srgbClr val="CC7832"/>
-                </a:solidFill>
-                <a:effectLst/>
-                <a:latin typeface="Consolas" panose="020B0609020204030204" pitchFamily="49" charset="0"/>
-                <a:cs typeface="Consolas" panose="020B0609020204030204" pitchFamily="49" charset="0"/>
-              </a:rPr>
-              <a:t>def </a:t>
-            </a:r>
-            <a:r>
-              <a:rPr lang="en-US" dirty="0" err="1">
-                <a:solidFill>
-                  <a:srgbClr val="FFC66D"/>
-                </a:solidFill>
-                <a:effectLst/>
-                <a:latin typeface="Consolas" panose="020B0609020204030204" pitchFamily="49" charset="0"/>
-                <a:cs typeface="Consolas" panose="020B0609020204030204" pitchFamily="49" charset="0"/>
-              </a:rPr>
-              <a:t>remove_auth</a:t>
-            </a:r>
-            <a:r>
-              <a:rPr lang="en-US" dirty="0">
-                <a:latin typeface="Consolas" panose="020B0609020204030204" pitchFamily="49" charset="0"/>
-                <a:cs typeface="Consolas" panose="020B0609020204030204" pitchFamily="49" charset="0"/>
-              </a:rPr>
-              <a:t>(name</a:t>
-            </a:r>
-            <a:r>
-              <a:rPr lang="en-US" dirty="0">
-                <a:solidFill>
-                  <a:srgbClr val="CC7832"/>
-                </a:solidFill>
-                <a:effectLst/>
-                <a:latin typeface="Consolas" panose="020B0609020204030204" pitchFamily="49" charset="0"/>
-                <a:cs typeface="Consolas" panose="020B0609020204030204" pitchFamily="49" charset="0"/>
-              </a:rPr>
-              <a:t>, </a:t>
-            </a:r>
-            <a:r>
-              <a:rPr lang="en-US" dirty="0">
-                <a:latin typeface="Consolas" panose="020B0609020204030204" pitchFamily="49" charset="0"/>
-                <a:cs typeface="Consolas" panose="020B0609020204030204" pitchFamily="49" charset="0"/>
-              </a:rPr>
-              <a:t>auth</a:t>
-            </a:r>
-            <a:r>
-              <a:rPr lang="en-US" dirty="0">
-                <a:solidFill>
-                  <a:srgbClr val="CC7832"/>
-                </a:solidFill>
-                <a:effectLst/>
-                <a:latin typeface="Consolas" panose="020B0609020204030204" pitchFamily="49" charset="0"/>
-                <a:cs typeface="Consolas" panose="020B0609020204030204" pitchFamily="49" charset="0"/>
-              </a:rPr>
-              <a:t>, </a:t>
-            </a:r>
-            <a:r>
-              <a:rPr lang="en-US" dirty="0" err="1">
-                <a:latin typeface="Consolas" panose="020B0609020204030204" pitchFamily="49" charset="0"/>
-                <a:cs typeface="Consolas" panose="020B0609020204030204" pitchFamily="49" charset="0"/>
-              </a:rPr>
-              <a:t>auth_dict</a:t>
-            </a:r>
-            <a:r>
-              <a:rPr lang="en-US" dirty="0">
-                <a:latin typeface="Consolas" panose="020B0609020204030204" pitchFamily="49" charset="0"/>
-                <a:cs typeface="Consolas" panose="020B0609020204030204" pitchFamily="49" charset="0"/>
-              </a:rPr>
-              <a:t>):</a:t>
-            </a:r>
-            <a:br>
-              <a:rPr lang="en-US" dirty="0">
-                <a:latin typeface="Consolas" panose="020B0609020204030204" pitchFamily="49" charset="0"/>
-                <a:cs typeface="Consolas" panose="020B0609020204030204" pitchFamily="49" charset="0"/>
-              </a:rPr>
-            </a:br>
-            <a:r>
-              <a:rPr lang="en-US" dirty="0">
-                <a:latin typeface="Consolas" panose="020B0609020204030204" pitchFamily="49" charset="0"/>
-                <a:cs typeface="Consolas" panose="020B0609020204030204" pitchFamily="49" charset="0"/>
-              </a:rPr>
-              <a:t>    </a:t>
-            </a:r>
-            <a:r>
-              <a:rPr lang="en-US" dirty="0">
-                <a:solidFill>
-                  <a:srgbClr val="CC7832"/>
-                </a:solidFill>
-                <a:effectLst/>
-                <a:latin typeface="Consolas" panose="020B0609020204030204" pitchFamily="49" charset="0"/>
-                <a:cs typeface="Consolas" panose="020B0609020204030204" pitchFamily="49" charset="0"/>
-              </a:rPr>
-              <a:t>if </a:t>
-            </a:r>
-            <a:r>
-              <a:rPr lang="en-US" dirty="0" err="1">
-                <a:latin typeface="Consolas" panose="020B0609020204030204" pitchFamily="49" charset="0"/>
-                <a:cs typeface="Consolas" panose="020B0609020204030204" pitchFamily="49" charset="0"/>
-              </a:rPr>
-              <a:t>is_auth</a:t>
-            </a:r>
-            <a:r>
-              <a:rPr lang="en-US" dirty="0">
-                <a:latin typeface="Consolas" panose="020B0609020204030204" pitchFamily="49" charset="0"/>
-                <a:cs typeface="Consolas" panose="020B0609020204030204" pitchFamily="49" charset="0"/>
-              </a:rPr>
-              <a:t>(name</a:t>
-            </a:r>
-            <a:r>
-              <a:rPr lang="en-US" dirty="0">
-                <a:solidFill>
-                  <a:srgbClr val="CC7832"/>
-                </a:solidFill>
-                <a:effectLst/>
-                <a:latin typeface="Consolas" panose="020B0609020204030204" pitchFamily="49" charset="0"/>
-                <a:cs typeface="Consolas" panose="020B0609020204030204" pitchFamily="49" charset="0"/>
-              </a:rPr>
-              <a:t>, </a:t>
-            </a:r>
-            <a:r>
-              <a:rPr lang="en-US" dirty="0">
-                <a:latin typeface="Consolas" panose="020B0609020204030204" pitchFamily="49" charset="0"/>
-                <a:cs typeface="Consolas" panose="020B0609020204030204" pitchFamily="49" charset="0"/>
-              </a:rPr>
-              <a:t>auth</a:t>
-            </a:r>
-            <a:r>
-              <a:rPr lang="en-US" dirty="0">
-                <a:solidFill>
-                  <a:srgbClr val="CC7832"/>
-                </a:solidFill>
-                <a:effectLst/>
-                <a:latin typeface="Consolas" panose="020B0609020204030204" pitchFamily="49" charset="0"/>
-                <a:cs typeface="Consolas" panose="020B0609020204030204" pitchFamily="49" charset="0"/>
-              </a:rPr>
-              <a:t>, </a:t>
-            </a:r>
-            <a:r>
-              <a:rPr lang="en-US" dirty="0" err="1">
-                <a:latin typeface="Consolas" panose="020B0609020204030204" pitchFamily="49" charset="0"/>
-                <a:cs typeface="Consolas" panose="020B0609020204030204" pitchFamily="49" charset="0"/>
-              </a:rPr>
-              <a:t>auth_dict</a:t>
-            </a:r>
-            <a:r>
-              <a:rPr lang="en-US" dirty="0">
-                <a:latin typeface="Consolas" panose="020B0609020204030204" pitchFamily="49" charset="0"/>
-                <a:cs typeface="Consolas" panose="020B0609020204030204" pitchFamily="49" charset="0"/>
-              </a:rPr>
-              <a:t>):</a:t>
-            </a:r>
-            <a:br>
-              <a:rPr lang="en-US" dirty="0">
-                <a:latin typeface="Consolas" panose="020B0609020204030204" pitchFamily="49" charset="0"/>
-                <a:cs typeface="Consolas" panose="020B0609020204030204" pitchFamily="49" charset="0"/>
-              </a:rPr>
-            </a:br>
-            <a:r>
-              <a:rPr lang="en-US" dirty="0">
-                <a:latin typeface="Consolas" panose="020B0609020204030204" pitchFamily="49" charset="0"/>
-                <a:cs typeface="Consolas" panose="020B0609020204030204" pitchFamily="49" charset="0"/>
-              </a:rPr>
-              <a:t>        </a:t>
-            </a:r>
-            <a:r>
-              <a:rPr lang="en-US" dirty="0" err="1">
-                <a:latin typeface="Consolas" panose="020B0609020204030204" pitchFamily="49" charset="0"/>
-                <a:cs typeface="Consolas" panose="020B0609020204030204" pitchFamily="49" charset="0"/>
-              </a:rPr>
-              <a:t>auth_dict</a:t>
-            </a:r>
-            <a:r>
-              <a:rPr lang="en-US" dirty="0">
-                <a:latin typeface="Consolas" panose="020B0609020204030204" pitchFamily="49" charset="0"/>
-                <a:cs typeface="Consolas" panose="020B0609020204030204" pitchFamily="49" charset="0"/>
-              </a:rPr>
-              <a:t>[name].remove(auth)</a:t>
-            </a:r>
-            <a:br>
-              <a:rPr lang="en-US" dirty="0">
-                <a:latin typeface="Consolas" panose="020B0609020204030204" pitchFamily="49" charset="0"/>
-                <a:cs typeface="Consolas" panose="020B0609020204030204" pitchFamily="49" charset="0"/>
-              </a:rPr>
-            </a:br>
-            <a:br>
-              <a:rPr lang="en-US" dirty="0">
-                <a:latin typeface="Consolas" panose="020B0609020204030204" pitchFamily="49" charset="0"/>
-                <a:cs typeface="Consolas" panose="020B0609020204030204" pitchFamily="49" charset="0"/>
-              </a:rPr>
-            </a:br>
-            <a:r>
-              <a:rPr lang="en-US" dirty="0">
-                <a:solidFill>
-                  <a:srgbClr val="CC7832"/>
-                </a:solidFill>
-                <a:effectLst/>
-                <a:latin typeface="Consolas" panose="020B0609020204030204" pitchFamily="49" charset="0"/>
-                <a:cs typeface="Consolas" panose="020B0609020204030204" pitchFamily="49" charset="0"/>
-              </a:rPr>
-              <a:t>def </a:t>
-            </a:r>
-            <a:r>
-              <a:rPr lang="en-US" dirty="0" err="1">
-                <a:solidFill>
-                  <a:srgbClr val="FFC66D"/>
-                </a:solidFill>
-                <a:effectLst/>
-                <a:latin typeface="Consolas" panose="020B0609020204030204" pitchFamily="49" charset="0"/>
-                <a:cs typeface="Consolas" panose="020B0609020204030204" pitchFamily="49" charset="0"/>
-              </a:rPr>
-              <a:t>clear_fighter</a:t>
-            </a:r>
-            <a:r>
-              <a:rPr lang="en-US" dirty="0">
-                <a:latin typeface="Consolas" panose="020B0609020204030204" pitchFamily="49" charset="0"/>
-                <a:cs typeface="Consolas" panose="020B0609020204030204" pitchFamily="49" charset="0"/>
-              </a:rPr>
-              <a:t>(name</a:t>
-            </a:r>
-            <a:r>
-              <a:rPr lang="en-US" dirty="0">
-                <a:solidFill>
-                  <a:srgbClr val="CC7832"/>
-                </a:solidFill>
-                <a:effectLst/>
-                <a:latin typeface="Consolas" panose="020B0609020204030204" pitchFamily="49" charset="0"/>
-                <a:cs typeface="Consolas" panose="020B0609020204030204" pitchFamily="49" charset="0"/>
-              </a:rPr>
-              <a:t>, </a:t>
-            </a:r>
-            <a:r>
-              <a:rPr lang="en-US" dirty="0" err="1">
-                <a:latin typeface="Consolas" panose="020B0609020204030204" pitchFamily="49" charset="0"/>
-                <a:cs typeface="Consolas" panose="020B0609020204030204" pitchFamily="49" charset="0"/>
-              </a:rPr>
-              <a:t>auth_dict</a:t>
-            </a:r>
-            <a:r>
-              <a:rPr lang="en-US" dirty="0">
-                <a:latin typeface="Consolas" panose="020B0609020204030204" pitchFamily="49" charset="0"/>
-                <a:cs typeface="Consolas" panose="020B0609020204030204" pitchFamily="49" charset="0"/>
-              </a:rPr>
-              <a:t>):</a:t>
-            </a:r>
-            <a:br>
-              <a:rPr lang="en-US" dirty="0">
-                <a:latin typeface="Consolas" panose="020B0609020204030204" pitchFamily="49" charset="0"/>
-                <a:cs typeface="Consolas" panose="020B0609020204030204" pitchFamily="49" charset="0"/>
-              </a:rPr>
-            </a:br>
-            <a:r>
-              <a:rPr lang="en-US" dirty="0">
-                <a:latin typeface="Consolas" panose="020B0609020204030204" pitchFamily="49" charset="0"/>
-                <a:cs typeface="Consolas" panose="020B0609020204030204" pitchFamily="49" charset="0"/>
-              </a:rPr>
-              <a:t> 	</a:t>
-            </a:r>
-            <a:r>
-              <a:rPr lang="en-US" dirty="0">
-                <a:solidFill>
-                  <a:srgbClr val="CC7832"/>
-                </a:solidFill>
-                <a:latin typeface="Consolas" panose="020B0609020204030204" pitchFamily="49" charset="0"/>
-                <a:cs typeface="Consolas" panose="020B0609020204030204" pitchFamily="49" charset="0"/>
-              </a:rPr>
-              <a:t>return</a:t>
-            </a:r>
-            <a:r>
-              <a:rPr lang="en-US" dirty="0">
-                <a:latin typeface="Consolas" panose="020B0609020204030204" pitchFamily="49" charset="0"/>
-                <a:cs typeface="Consolas" panose="020B0609020204030204" pitchFamily="49" charset="0"/>
-              </a:rPr>
-              <a:t> </a:t>
-            </a:r>
-            <a:r>
-              <a:rPr lang="en-US" dirty="0" err="1">
-                <a:latin typeface="Consolas" panose="020B0609020204030204" pitchFamily="49" charset="0"/>
-                <a:cs typeface="Consolas" panose="020B0609020204030204" pitchFamily="49" charset="0"/>
-              </a:rPr>
-              <a:t>auth_dict.pop</a:t>
-            </a:r>
-            <a:r>
-              <a:rPr lang="en-US" dirty="0">
-                <a:latin typeface="Consolas" panose="020B0609020204030204" pitchFamily="49" charset="0"/>
-                <a:cs typeface="Consolas" panose="020B0609020204030204" pitchFamily="49" charset="0"/>
-              </a:rPr>
-              <a:t>(name, None)</a:t>
-            </a:r>
-          </a:p>
-        </p:txBody>
-      </p:sp>
-    </p:spTree>
-    <p:extLst>
-      <p:ext uri="{BB962C8B-B14F-4D97-AF65-F5344CB8AC3E}">
-        <p14:creationId xmlns:p14="http://schemas.microsoft.com/office/powerpoint/2010/main" val="282863079"/>
-      </p:ext>
-    </p:extLst>
-  </p:cSld>
-  <p:clrMapOvr>
-    <a:masterClrMapping/>
-  </p:clrMapOvr>
-  <mc:AlternateContent xmlns:mc="http://schemas.openxmlformats.org/markup-compatibility/2006">
-    <mc:Choice xmlns:p14="http://schemas.microsoft.com/office/powerpoint/2010/main" Requires="p14">
-      <p:transition p14:dur="300">
-        <p:fade/>
-      </p:transition>
-    </mc:Choice>
-    <mc:Fallback>
-      <p:transition>
-        <p:fade/>
-      </p:transition>
-    </mc:Fallback>
-  </mc:AlternateContent>
 </p:sld>
 </file>
 

</xml_diff>